<commit_message>
Hanjun is Gao Fu Shuai
</commit_message>
<xml_diff>
--- a/Shuxin/Pictures.pptx
+++ b/Shuxin/Pictures.pptx
@@ -7,6 +7,7 @@
   <p:sldIdLst>
     <p:sldId id="256" r:id="rId2"/>
     <p:sldId id="257" r:id="rId3"/>
+    <p:sldId id="258" r:id="rId4"/>
   </p:sldIdLst>
   <p:sldSz cx="12192000" cy="6858000"/>
   <p:notesSz cx="6858000" cy="9144000"/>
@@ -105,7 +106,24 @@
       </a:defRPr>
     </a:lvl9pPr>
   </p:defaultTextStyle>
+  <p:extLst>
+    <p:ext uri="{EFAFB233-063F-42B5-8137-9DF3F51BA10A}">
+      <p15:sldGuideLst xmlns:p15="http://schemas.microsoft.com/office/powerpoint/2012/main"/>
+    </p:ext>
+  </p:extLst>
 </p:presentation>
+</file>
+
+<file path=ppt/commentAuthors.xml><?xml version="1.0" encoding="utf-8"?>
+<p:cmAuthorLst xmlns:a="http://schemas.openxmlformats.org/drawingml/2006/main" xmlns:r="http://schemas.openxmlformats.org/officeDocument/2006/relationships" xmlns:p="http://schemas.openxmlformats.org/presentationml/2006/main">
+  <p:cmAuthor id="1" name="郑书新" initials="郑书新" lastIdx="1" clrIdx="0">
+    <p:extLst>
+      <p:ext uri="{19B8F6BF-5375-455C-9EA6-DF929625EA0E}">
+        <p15:presenceInfo xmlns:p15="http://schemas.microsoft.com/office/powerpoint/2012/main" userId="e444bd19c59def03" providerId="Windows Live"/>
+      </p:ext>
+    </p:extLst>
+  </p:cmAuthor>
+</p:cmAuthorLst>
 </file>
 
 <file path=ppt/slideLayouts/slideLayout1.xml><?xml version="1.0" encoding="utf-8"?>
@@ -4118,6 +4136,4090 @@
 </p:sld>
 </file>
 
+<file path=ppt/slides/slide3.xml><?xml version="1.0" encoding="utf-8"?>
+<p:sld xmlns:a="http://schemas.openxmlformats.org/drawingml/2006/main" xmlns:r="http://schemas.openxmlformats.org/officeDocument/2006/relationships" xmlns:p="http://schemas.openxmlformats.org/presentationml/2006/main">
+  <p:cSld>
+    <p:spTree>
+      <p:nvGrpSpPr>
+        <p:cNvPr id="1" name=""/>
+        <p:cNvGrpSpPr/>
+        <p:nvPr/>
+      </p:nvGrpSpPr>
+      <p:grpSpPr>
+        <a:xfrm>
+          <a:off x="0" y="0"/>
+          <a:ext cx="0" cy="0"/>
+          <a:chOff x="0" y="0"/>
+          <a:chExt cx="0" cy="0"/>
+        </a:xfrm>
+      </p:grpSpPr>
+      <p:sp>
+        <p:nvSpPr>
+          <p:cNvPr id="4" name="圆角矩形 3"/>
+          <p:cNvSpPr/>
+          <p:nvPr/>
+        </p:nvSpPr>
+        <p:spPr>
+          <a:xfrm>
+            <a:off x="2475151" y="1078024"/>
+            <a:ext cx="278728" cy="1694327"/>
+          </a:xfrm>
+          <a:prstGeom prst="roundRect">
+            <a:avLst/>
+          </a:prstGeom>
+        </p:spPr>
+        <p:style>
+          <a:lnRef idx="2">
+            <a:schemeClr val="accent1">
+              <a:shade val="50000"/>
+            </a:schemeClr>
+          </a:lnRef>
+          <a:fillRef idx="1">
+            <a:schemeClr val="accent1"/>
+          </a:fillRef>
+          <a:effectRef idx="0">
+            <a:schemeClr val="accent1"/>
+          </a:effectRef>
+          <a:fontRef idx="minor">
+            <a:schemeClr val="lt1"/>
+          </a:fontRef>
+        </p:style>
+        <p:txBody>
+          <a:bodyPr rtlCol="0" anchor="ctr"/>
+          <a:lstStyle>
+            <a:defPPr>
+              <a:defRPr lang="zh-CN"/>
+            </a:defPPr>
+            <a:lvl1pPr marL="0" algn="l" defTabSz="914400" rtl="0" eaLnBrk="1" latinLnBrk="0" hangingPunct="1">
+              <a:defRPr sz="1800" kern="1200">
+                <a:solidFill>
+                  <a:schemeClr val="lt1"/>
+                </a:solidFill>
+                <a:latin typeface="+mn-lt"/>
+                <a:ea typeface="+mn-ea"/>
+                <a:cs typeface="+mn-cs"/>
+              </a:defRPr>
+            </a:lvl1pPr>
+            <a:lvl2pPr marL="457200" algn="l" defTabSz="914400" rtl="0" eaLnBrk="1" latinLnBrk="0" hangingPunct="1">
+              <a:defRPr sz="1800" kern="1200">
+                <a:solidFill>
+                  <a:schemeClr val="lt1"/>
+                </a:solidFill>
+                <a:latin typeface="+mn-lt"/>
+                <a:ea typeface="+mn-ea"/>
+                <a:cs typeface="+mn-cs"/>
+              </a:defRPr>
+            </a:lvl2pPr>
+            <a:lvl3pPr marL="914400" algn="l" defTabSz="914400" rtl="0" eaLnBrk="1" latinLnBrk="0" hangingPunct="1">
+              <a:defRPr sz="1800" kern="1200">
+                <a:solidFill>
+                  <a:schemeClr val="lt1"/>
+                </a:solidFill>
+                <a:latin typeface="+mn-lt"/>
+                <a:ea typeface="+mn-ea"/>
+                <a:cs typeface="+mn-cs"/>
+              </a:defRPr>
+            </a:lvl3pPr>
+            <a:lvl4pPr marL="1371600" algn="l" defTabSz="914400" rtl="0" eaLnBrk="1" latinLnBrk="0" hangingPunct="1">
+              <a:defRPr sz="1800" kern="1200">
+                <a:solidFill>
+                  <a:schemeClr val="lt1"/>
+                </a:solidFill>
+                <a:latin typeface="+mn-lt"/>
+                <a:ea typeface="+mn-ea"/>
+                <a:cs typeface="+mn-cs"/>
+              </a:defRPr>
+            </a:lvl4pPr>
+            <a:lvl5pPr marL="1828800" algn="l" defTabSz="914400" rtl="0" eaLnBrk="1" latinLnBrk="0" hangingPunct="1">
+              <a:defRPr sz="1800" kern="1200">
+                <a:solidFill>
+                  <a:schemeClr val="lt1"/>
+                </a:solidFill>
+                <a:latin typeface="+mn-lt"/>
+                <a:ea typeface="+mn-ea"/>
+                <a:cs typeface="+mn-cs"/>
+              </a:defRPr>
+            </a:lvl5pPr>
+            <a:lvl6pPr marL="2286000" algn="l" defTabSz="914400" rtl="0" eaLnBrk="1" latinLnBrk="0" hangingPunct="1">
+              <a:defRPr sz="1800" kern="1200">
+                <a:solidFill>
+                  <a:schemeClr val="lt1"/>
+                </a:solidFill>
+                <a:latin typeface="+mn-lt"/>
+                <a:ea typeface="+mn-ea"/>
+                <a:cs typeface="+mn-cs"/>
+              </a:defRPr>
+            </a:lvl6pPr>
+            <a:lvl7pPr marL="2743200" algn="l" defTabSz="914400" rtl="0" eaLnBrk="1" latinLnBrk="0" hangingPunct="1">
+              <a:defRPr sz="1800" kern="1200">
+                <a:solidFill>
+                  <a:schemeClr val="lt1"/>
+                </a:solidFill>
+                <a:latin typeface="+mn-lt"/>
+                <a:ea typeface="+mn-ea"/>
+                <a:cs typeface="+mn-cs"/>
+              </a:defRPr>
+            </a:lvl7pPr>
+            <a:lvl8pPr marL="3200400" algn="l" defTabSz="914400" rtl="0" eaLnBrk="1" latinLnBrk="0" hangingPunct="1">
+              <a:defRPr sz="1800" kern="1200">
+                <a:solidFill>
+                  <a:schemeClr val="lt1"/>
+                </a:solidFill>
+                <a:latin typeface="+mn-lt"/>
+                <a:ea typeface="+mn-ea"/>
+                <a:cs typeface="+mn-cs"/>
+              </a:defRPr>
+            </a:lvl8pPr>
+            <a:lvl9pPr marL="3657600" algn="l" defTabSz="914400" rtl="0" eaLnBrk="1" latinLnBrk="0" hangingPunct="1">
+              <a:defRPr sz="1800" kern="1200">
+                <a:solidFill>
+                  <a:schemeClr val="lt1"/>
+                </a:solidFill>
+                <a:latin typeface="+mn-lt"/>
+                <a:ea typeface="+mn-ea"/>
+                <a:cs typeface="+mn-cs"/>
+              </a:defRPr>
+            </a:lvl9pPr>
+          </a:lstStyle>
+          <a:p>
+            <a:pPr algn="ctr"/>
+            <a:endParaRPr lang="zh-CN" altLang="en-US"/>
+          </a:p>
+        </p:txBody>
+      </p:sp>
+      <p:sp>
+        <p:nvSpPr>
+          <p:cNvPr id="5" name="圆角矩形 4"/>
+          <p:cNvSpPr/>
+          <p:nvPr/>
+        </p:nvSpPr>
+        <p:spPr>
+          <a:xfrm>
+            <a:off x="4102244" y="593930"/>
+            <a:ext cx="277216" cy="2178422"/>
+          </a:xfrm>
+          <a:prstGeom prst="roundRect">
+            <a:avLst/>
+          </a:prstGeom>
+        </p:spPr>
+        <p:style>
+          <a:lnRef idx="2">
+            <a:schemeClr val="accent1">
+              <a:shade val="50000"/>
+            </a:schemeClr>
+          </a:lnRef>
+          <a:fillRef idx="1">
+            <a:schemeClr val="accent1"/>
+          </a:fillRef>
+          <a:effectRef idx="0">
+            <a:schemeClr val="accent1"/>
+          </a:effectRef>
+          <a:fontRef idx="minor">
+            <a:schemeClr val="lt1"/>
+          </a:fontRef>
+        </p:style>
+        <p:txBody>
+          <a:bodyPr rtlCol="0" anchor="ctr"/>
+          <a:lstStyle>
+            <a:defPPr>
+              <a:defRPr lang="zh-CN"/>
+            </a:defPPr>
+            <a:lvl1pPr marL="0" algn="l" defTabSz="914400" rtl="0" eaLnBrk="1" latinLnBrk="0" hangingPunct="1">
+              <a:defRPr sz="1800" kern="1200">
+                <a:solidFill>
+                  <a:schemeClr val="lt1"/>
+                </a:solidFill>
+                <a:latin typeface="+mn-lt"/>
+                <a:ea typeface="+mn-ea"/>
+                <a:cs typeface="+mn-cs"/>
+              </a:defRPr>
+            </a:lvl1pPr>
+            <a:lvl2pPr marL="457200" algn="l" defTabSz="914400" rtl="0" eaLnBrk="1" latinLnBrk="0" hangingPunct="1">
+              <a:defRPr sz="1800" kern="1200">
+                <a:solidFill>
+                  <a:schemeClr val="lt1"/>
+                </a:solidFill>
+                <a:latin typeface="+mn-lt"/>
+                <a:ea typeface="+mn-ea"/>
+                <a:cs typeface="+mn-cs"/>
+              </a:defRPr>
+            </a:lvl2pPr>
+            <a:lvl3pPr marL="914400" algn="l" defTabSz="914400" rtl="0" eaLnBrk="1" latinLnBrk="0" hangingPunct="1">
+              <a:defRPr sz="1800" kern="1200">
+                <a:solidFill>
+                  <a:schemeClr val="lt1"/>
+                </a:solidFill>
+                <a:latin typeface="+mn-lt"/>
+                <a:ea typeface="+mn-ea"/>
+                <a:cs typeface="+mn-cs"/>
+              </a:defRPr>
+            </a:lvl3pPr>
+            <a:lvl4pPr marL="1371600" algn="l" defTabSz="914400" rtl="0" eaLnBrk="1" latinLnBrk="0" hangingPunct="1">
+              <a:defRPr sz="1800" kern="1200">
+                <a:solidFill>
+                  <a:schemeClr val="lt1"/>
+                </a:solidFill>
+                <a:latin typeface="+mn-lt"/>
+                <a:ea typeface="+mn-ea"/>
+                <a:cs typeface="+mn-cs"/>
+              </a:defRPr>
+            </a:lvl4pPr>
+            <a:lvl5pPr marL="1828800" algn="l" defTabSz="914400" rtl="0" eaLnBrk="1" latinLnBrk="0" hangingPunct="1">
+              <a:defRPr sz="1800" kern="1200">
+                <a:solidFill>
+                  <a:schemeClr val="lt1"/>
+                </a:solidFill>
+                <a:latin typeface="+mn-lt"/>
+                <a:ea typeface="+mn-ea"/>
+                <a:cs typeface="+mn-cs"/>
+              </a:defRPr>
+            </a:lvl5pPr>
+            <a:lvl6pPr marL="2286000" algn="l" defTabSz="914400" rtl="0" eaLnBrk="1" latinLnBrk="0" hangingPunct="1">
+              <a:defRPr sz="1800" kern="1200">
+                <a:solidFill>
+                  <a:schemeClr val="lt1"/>
+                </a:solidFill>
+                <a:latin typeface="+mn-lt"/>
+                <a:ea typeface="+mn-ea"/>
+                <a:cs typeface="+mn-cs"/>
+              </a:defRPr>
+            </a:lvl6pPr>
+            <a:lvl7pPr marL="2743200" algn="l" defTabSz="914400" rtl="0" eaLnBrk="1" latinLnBrk="0" hangingPunct="1">
+              <a:defRPr sz="1800" kern="1200">
+                <a:solidFill>
+                  <a:schemeClr val="lt1"/>
+                </a:solidFill>
+                <a:latin typeface="+mn-lt"/>
+                <a:ea typeface="+mn-ea"/>
+                <a:cs typeface="+mn-cs"/>
+              </a:defRPr>
+            </a:lvl7pPr>
+            <a:lvl8pPr marL="3200400" algn="l" defTabSz="914400" rtl="0" eaLnBrk="1" latinLnBrk="0" hangingPunct="1">
+              <a:defRPr sz="1800" kern="1200">
+                <a:solidFill>
+                  <a:schemeClr val="lt1"/>
+                </a:solidFill>
+                <a:latin typeface="+mn-lt"/>
+                <a:ea typeface="+mn-ea"/>
+                <a:cs typeface="+mn-cs"/>
+              </a:defRPr>
+            </a:lvl8pPr>
+            <a:lvl9pPr marL="3657600" algn="l" defTabSz="914400" rtl="0" eaLnBrk="1" latinLnBrk="0" hangingPunct="1">
+              <a:defRPr sz="1800" kern="1200">
+                <a:solidFill>
+                  <a:schemeClr val="lt1"/>
+                </a:solidFill>
+                <a:latin typeface="+mn-lt"/>
+                <a:ea typeface="+mn-ea"/>
+                <a:cs typeface="+mn-cs"/>
+              </a:defRPr>
+            </a:lvl9pPr>
+          </a:lstStyle>
+          <a:p>
+            <a:pPr algn="ctr"/>
+            <a:endParaRPr lang="zh-CN" altLang="en-US"/>
+          </a:p>
+        </p:txBody>
+      </p:sp>
+      <p:sp>
+        <p:nvSpPr>
+          <p:cNvPr id="6" name="圆角矩形 5"/>
+          <p:cNvSpPr/>
+          <p:nvPr/>
+        </p:nvSpPr>
+        <p:spPr>
+          <a:xfrm>
+            <a:off x="5742785" y="593930"/>
+            <a:ext cx="261513" cy="2178422"/>
+          </a:xfrm>
+          <a:prstGeom prst="roundRect">
+            <a:avLst/>
+          </a:prstGeom>
+        </p:spPr>
+        <p:style>
+          <a:lnRef idx="2">
+            <a:schemeClr val="accent1">
+              <a:shade val="50000"/>
+            </a:schemeClr>
+          </a:lnRef>
+          <a:fillRef idx="1">
+            <a:schemeClr val="accent1"/>
+          </a:fillRef>
+          <a:effectRef idx="0">
+            <a:schemeClr val="accent1"/>
+          </a:effectRef>
+          <a:fontRef idx="minor">
+            <a:schemeClr val="lt1"/>
+          </a:fontRef>
+        </p:style>
+        <p:txBody>
+          <a:bodyPr rtlCol="0" anchor="ctr"/>
+          <a:lstStyle>
+            <a:defPPr>
+              <a:defRPr lang="zh-CN"/>
+            </a:defPPr>
+            <a:lvl1pPr marL="0" algn="l" defTabSz="914400" rtl="0" eaLnBrk="1" latinLnBrk="0" hangingPunct="1">
+              <a:defRPr sz="1800" kern="1200">
+                <a:solidFill>
+                  <a:schemeClr val="lt1"/>
+                </a:solidFill>
+                <a:latin typeface="+mn-lt"/>
+                <a:ea typeface="+mn-ea"/>
+                <a:cs typeface="+mn-cs"/>
+              </a:defRPr>
+            </a:lvl1pPr>
+            <a:lvl2pPr marL="457200" algn="l" defTabSz="914400" rtl="0" eaLnBrk="1" latinLnBrk="0" hangingPunct="1">
+              <a:defRPr sz="1800" kern="1200">
+                <a:solidFill>
+                  <a:schemeClr val="lt1"/>
+                </a:solidFill>
+                <a:latin typeface="+mn-lt"/>
+                <a:ea typeface="+mn-ea"/>
+                <a:cs typeface="+mn-cs"/>
+              </a:defRPr>
+            </a:lvl2pPr>
+            <a:lvl3pPr marL="914400" algn="l" defTabSz="914400" rtl="0" eaLnBrk="1" latinLnBrk="0" hangingPunct="1">
+              <a:defRPr sz="1800" kern="1200">
+                <a:solidFill>
+                  <a:schemeClr val="lt1"/>
+                </a:solidFill>
+                <a:latin typeface="+mn-lt"/>
+                <a:ea typeface="+mn-ea"/>
+                <a:cs typeface="+mn-cs"/>
+              </a:defRPr>
+            </a:lvl3pPr>
+            <a:lvl4pPr marL="1371600" algn="l" defTabSz="914400" rtl="0" eaLnBrk="1" latinLnBrk="0" hangingPunct="1">
+              <a:defRPr sz="1800" kern="1200">
+                <a:solidFill>
+                  <a:schemeClr val="lt1"/>
+                </a:solidFill>
+                <a:latin typeface="+mn-lt"/>
+                <a:ea typeface="+mn-ea"/>
+                <a:cs typeface="+mn-cs"/>
+              </a:defRPr>
+            </a:lvl4pPr>
+            <a:lvl5pPr marL="1828800" algn="l" defTabSz="914400" rtl="0" eaLnBrk="1" latinLnBrk="0" hangingPunct="1">
+              <a:defRPr sz="1800" kern="1200">
+                <a:solidFill>
+                  <a:schemeClr val="lt1"/>
+                </a:solidFill>
+                <a:latin typeface="+mn-lt"/>
+                <a:ea typeface="+mn-ea"/>
+                <a:cs typeface="+mn-cs"/>
+              </a:defRPr>
+            </a:lvl5pPr>
+            <a:lvl6pPr marL="2286000" algn="l" defTabSz="914400" rtl="0" eaLnBrk="1" latinLnBrk="0" hangingPunct="1">
+              <a:defRPr sz="1800" kern="1200">
+                <a:solidFill>
+                  <a:schemeClr val="lt1"/>
+                </a:solidFill>
+                <a:latin typeface="+mn-lt"/>
+                <a:ea typeface="+mn-ea"/>
+                <a:cs typeface="+mn-cs"/>
+              </a:defRPr>
+            </a:lvl6pPr>
+            <a:lvl7pPr marL="2743200" algn="l" defTabSz="914400" rtl="0" eaLnBrk="1" latinLnBrk="0" hangingPunct="1">
+              <a:defRPr sz="1800" kern="1200">
+                <a:solidFill>
+                  <a:schemeClr val="lt1"/>
+                </a:solidFill>
+                <a:latin typeface="+mn-lt"/>
+                <a:ea typeface="+mn-ea"/>
+                <a:cs typeface="+mn-cs"/>
+              </a:defRPr>
+            </a:lvl7pPr>
+            <a:lvl8pPr marL="3200400" algn="l" defTabSz="914400" rtl="0" eaLnBrk="1" latinLnBrk="0" hangingPunct="1">
+              <a:defRPr sz="1800" kern="1200">
+                <a:solidFill>
+                  <a:schemeClr val="lt1"/>
+                </a:solidFill>
+                <a:latin typeface="+mn-lt"/>
+                <a:ea typeface="+mn-ea"/>
+                <a:cs typeface="+mn-cs"/>
+              </a:defRPr>
+            </a:lvl8pPr>
+            <a:lvl9pPr marL="3657600" algn="l" defTabSz="914400" rtl="0" eaLnBrk="1" latinLnBrk="0" hangingPunct="1">
+              <a:defRPr sz="1800" kern="1200">
+                <a:solidFill>
+                  <a:schemeClr val="lt1"/>
+                </a:solidFill>
+                <a:latin typeface="+mn-lt"/>
+                <a:ea typeface="+mn-ea"/>
+                <a:cs typeface="+mn-cs"/>
+              </a:defRPr>
+            </a:lvl9pPr>
+          </a:lstStyle>
+          <a:p>
+            <a:pPr algn="ctr"/>
+            <a:endParaRPr lang="zh-CN" altLang="en-US"/>
+          </a:p>
+        </p:txBody>
+      </p:sp>
+      <p:sp>
+        <p:nvSpPr>
+          <p:cNvPr id="7" name="圆角矩形 6"/>
+          <p:cNvSpPr/>
+          <p:nvPr/>
+        </p:nvSpPr>
+        <p:spPr>
+          <a:xfrm>
+            <a:off x="7383326" y="1760231"/>
+            <a:ext cx="345205" cy="1711367"/>
+          </a:xfrm>
+          <a:prstGeom prst="roundRect">
+            <a:avLst/>
+          </a:prstGeom>
+        </p:spPr>
+        <p:style>
+          <a:lnRef idx="2">
+            <a:schemeClr val="accent1">
+              <a:shade val="50000"/>
+            </a:schemeClr>
+          </a:lnRef>
+          <a:fillRef idx="1">
+            <a:schemeClr val="accent1"/>
+          </a:fillRef>
+          <a:effectRef idx="0">
+            <a:schemeClr val="accent1"/>
+          </a:effectRef>
+          <a:fontRef idx="minor">
+            <a:schemeClr val="lt1"/>
+          </a:fontRef>
+        </p:style>
+        <p:txBody>
+          <a:bodyPr rot="0" spcFirstLastPara="0" vert="horz" wrap="square" lIns="91440" tIns="45720" rIns="91440" bIns="45720" numCol="1" spcCol="0" rtlCol="0" fromWordArt="0" anchor="ctr" anchorCtr="0" forceAA="0" compatLnSpc="1">
+            <a:prstTxWarp prst="textNoShape">
+              <a:avLst/>
+            </a:prstTxWarp>
+            <a:noAutofit/>
+          </a:bodyPr>
+          <a:lstStyle>
+            <a:defPPr>
+              <a:defRPr lang="zh-CN"/>
+            </a:defPPr>
+            <a:lvl1pPr marL="0" algn="l" defTabSz="914400" rtl="0" eaLnBrk="1" latinLnBrk="0" hangingPunct="1">
+              <a:defRPr sz="1800" kern="1200">
+                <a:solidFill>
+                  <a:schemeClr val="lt1"/>
+                </a:solidFill>
+                <a:latin typeface="+mn-lt"/>
+                <a:ea typeface="+mn-ea"/>
+                <a:cs typeface="+mn-cs"/>
+              </a:defRPr>
+            </a:lvl1pPr>
+            <a:lvl2pPr marL="457200" algn="l" defTabSz="914400" rtl="0" eaLnBrk="1" latinLnBrk="0" hangingPunct="1">
+              <a:defRPr sz="1800" kern="1200">
+                <a:solidFill>
+                  <a:schemeClr val="lt1"/>
+                </a:solidFill>
+                <a:latin typeface="+mn-lt"/>
+                <a:ea typeface="+mn-ea"/>
+                <a:cs typeface="+mn-cs"/>
+              </a:defRPr>
+            </a:lvl2pPr>
+            <a:lvl3pPr marL="914400" algn="l" defTabSz="914400" rtl="0" eaLnBrk="1" latinLnBrk="0" hangingPunct="1">
+              <a:defRPr sz="1800" kern="1200">
+                <a:solidFill>
+                  <a:schemeClr val="lt1"/>
+                </a:solidFill>
+                <a:latin typeface="+mn-lt"/>
+                <a:ea typeface="+mn-ea"/>
+                <a:cs typeface="+mn-cs"/>
+              </a:defRPr>
+            </a:lvl3pPr>
+            <a:lvl4pPr marL="1371600" algn="l" defTabSz="914400" rtl="0" eaLnBrk="1" latinLnBrk="0" hangingPunct="1">
+              <a:defRPr sz="1800" kern="1200">
+                <a:solidFill>
+                  <a:schemeClr val="lt1"/>
+                </a:solidFill>
+                <a:latin typeface="+mn-lt"/>
+                <a:ea typeface="+mn-ea"/>
+                <a:cs typeface="+mn-cs"/>
+              </a:defRPr>
+            </a:lvl4pPr>
+            <a:lvl5pPr marL="1828800" algn="l" defTabSz="914400" rtl="0" eaLnBrk="1" latinLnBrk="0" hangingPunct="1">
+              <a:defRPr sz="1800" kern="1200">
+                <a:solidFill>
+                  <a:schemeClr val="lt1"/>
+                </a:solidFill>
+                <a:latin typeface="+mn-lt"/>
+                <a:ea typeface="+mn-ea"/>
+                <a:cs typeface="+mn-cs"/>
+              </a:defRPr>
+            </a:lvl5pPr>
+            <a:lvl6pPr marL="2286000" algn="l" defTabSz="914400" rtl="0" eaLnBrk="1" latinLnBrk="0" hangingPunct="1">
+              <a:defRPr sz="1800" kern="1200">
+                <a:solidFill>
+                  <a:schemeClr val="lt1"/>
+                </a:solidFill>
+                <a:latin typeface="+mn-lt"/>
+                <a:ea typeface="+mn-ea"/>
+                <a:cs typeface="+mn-cs"/>
+              </a:defRPr>
+            </a:lvl6pPr>
+            <a:lvl7pPr marL="2743200" algn="l" defTabSz="914400" rtl="0" eaLnBrk="1" latinLnBrk="0" hangingPunct="1">
+              <a:defRPr sz="1800" kern="1200">
+                <a:solidFill>
+                  <a:schemeClr val="lt1"/>
+                </a:solidFill>
+                <a:latin typeface="+mn-lt"/>
+                <a:ea typeface="+mn-ea"/>
+                <a:cs typeface="+mn-cs"/>
+              </a:defRPr>
+            </a:lvl7pPr>
+            <a:lvl8pPr marL="3200400" algn="l" defTabSz="914400" rtl="0" eaLnBrk="1" latinLnBrk="0" hangingPunct="1">
+              <a:defRPr sz="1800" kern="1200">
+                <a:solidFill>
+                  <a:schemeClr val="lt1"/>
+                </a:solidFill>
+                <a:latin typeface="+mn-lt"/>
+                <a:ea typeface="+mn-ea"/>
+                <a:cs typeface="+mn-cs"/>
+              </a:defRPr>
+            </a:lvl8pPr>
+            <a:lvl9pPr marL="3657600" algn="l" defTabSz="914400" rtl="0" eaLnBrk="1" latinLnBrk="0" hangingPunct="1">
+              <a:defRPr sz="1800" kern="1200">
+                <a:solidFill>
+                  <a:schemeClr val="lt1"/>
+                </a:solidFill>
+                <a:latin typeface="+mn-lt"/>
+                <a:ea typeface="+mn-ea"/>
+                <a:cs typeface="+mn-cs"/>
+              </a:defRPr>
+            </a:lvl9pPr>
+          </a:lstStyle>
+          <a:p>
+            <a:pPr algn="ctr"/>
+            <a:endParaRPr lang="zh-CN" altLang="en-US"/>
+          </a:p>
+        </p:txBody>
+      </p:sp>
+      <p:sp>
+        <p:nvSpPr>
+          <p:cNvPr id="8" name="文本框 7"/>
+          <p:cNvSpPr txBox="1"/>
+          <p:nvPr/>
+        </p:nvSpPr>
+        <p:spPr>
+          <a:xfrm>
+            <a:off x="2197932" y="593929"/>
+            <a:ext cx="877163" cy="369332"/>
+          </a:xfrm>
+          <a:prstGeom prst="rect">
+            <a:avLst/>
+          </a:prstGeom>
+          <a:noFill/>
+        </p:spPr>
+        <p:txBody>
+          <a:bodyPr wrap="none" rtlCol="0">
+            <a:spAutoFit/>
+          </a:bodyPr>
+          <a:lstStyle>
+            <a:defPPr>
+              <a:defRPr lang="zh-CN"/>
+            </a:defPPr>
+            <a:lvl1pPr marL="0" algn="l" defTabSz="914400" rtl="0" eaLnBrk="1" latinLnBrk="0" hangingPunct="1">
+              <a:defRPr sz="1800" kern="1200">
+                <a:solidFill>
+                  <a:schemeClr val="tx1"/>
+                </a:solidFill>
+                <a:latin typeface="+mn-lt"/>
+                <a:ea typeface="+mn-ea"/>
+                <a:cs typeface="+mn-cs"/>
+              </a:defRPr>
+            </a:lvl1pPr>
+            <a:lvl2pPr marL="457200" algn="l" defTabSz="914400" rtl="0" eaLnBrk="1" latinLnBrk="0" hangingPunct="1">
+              <a:defRPr sz="1800" kern="1200">
+                <a:solidFill>
+                  <a:schemeClr val="tx1"/>
+                </a:solidFill>
+                <a:latin typeface="+mn-lt"/>
+                <a:ea typeface="+mn-ea"/>
+                <a:cs typeface="+mn-cs"/>
+              </a:defRPr>
+            </a:lvl2pPr>
+            <a:lvl3pPr marL="914400" algn="l" defTabSz="914400" rtl="0" eaLnBrk="1" latinLnBrk="0" hangingPunct="1">
+              <a:defRPr sz="1800" kern="1200">
+                <a:solidFill>
+                  <a:schemeClr val="tx1"/>
+                </a:solidFill>
+                <a:latin typeface="+mn-lt"/>
+                <a:ea typeface="+mn-ea"/>
+                <a:cs typeface="+mn-cs"/>
+              </a:defRPr>
+            </a:lvl3pPr>
+            <a:lvl4pPr marL="1371600" algn="l" defTabSz="914400" rtl="0" eaLnBrk="1" latinLnBrk="0" hangingPunct="1">
+              <a:defRPr sz="1800" kern="1200">
+                <a:solidFill>
+                  <a:schemeClr val="tx1"/>
+                </a:solidFill>
+                <a:latin typeface="+mn-lt"/>
+                <a:ea typeface="+mn-ea"/>
+                <a:cs typeface="+mn-cs"/>
+              </a:defRPr>
+            </a:lvl4pPr>
+            <a:lvl5pPr marL="1828800" algn="l" defTabSz="914400" rtl="0" eaLnBrk="1" latinLnBrk="0" hangingPunct="1">
+              <a:defRPr sz="1800" kern="1200">
+                <a:solidFill>
+                  <a:schemeClr val="tx1"/>
+                </a:solidFill>
+                <a:latin typeface="+mn-lt"/>
+                <a:ea typeface="+mn-ea"/>
+                <a:cs typeface="+mn-cs"/>
+              </a:defRPr>
+            </a:lvl5pPr>
+            <a:lvl6pPr marL="2286000" algn="l" defTabSz="914400" rtl="0" eaLnBrk="1" latinLnBrk="0" hangingPunct="1">
+              <a:defRPr sz="1800" kern="1200">
+                <a:solidFill>
+                  <a:schemeClr val="tx1"/>
+                </a:solidFill>
+                <a:latin typeface="+mn-lt"/>
+                <a:ea typeface="+mn-ea"/>
+                <a:cs typeface="+mn-cs"/>
+              </a:defRPr>
+            </a:lvl6pPr>
+            <a:lvl7pPr marL="2743200" algn="l" defTabSz="914400" rtl="0" eaLnBrk="1" latinLnBrk="0" hangingPunct="1">
+              <a:defRPr sz="1800" kern="1200">
+                <a:solidFill>
+                  <a:schemeClr val="tx1"/>
+                </a:solidFill>
+                <a:latin typeface="+mn-lt"/>
+                <a:ea typeface="+mn-ea"/>
+                <a:cs typeface="+mn-cs"/>
+              </a:defRPr>
+            </a:lvl7pPr>
+            <a:lvl8pPr marL="3200400" algn="l" defTabSz="914400" rtl="0" eaLnBrk="1" latinLnBrk="0" hangingPunct="1">
+              <a:defRPr sz="1800" kern="1200">
+                <a:solidFill>
+                  <a:schemeClr val="tx1"/>
+                </a:solidFill>
+                <a:latin typeface="+mn-lt"/>
+                <a:ea typeface="+mn-ea"/>
+                <a:cs typeface="+mn-cs"/>
+              </a:defRPr>
+            </a:lvl8pPr>
+            <a:lvl9pPr marL="3657600" algn="l" defTabSz="914400" rtl="0" eaLnBrk="1" latinLnBrk="0" hangingPunct="1">
+              <a:defRPr sz="1800" kern="1200">
+                <a:solidFill>
+                  <a:schemeClr val="tx1"/>
+                </a:solidFill>
+                <a:latin typeface="+mn-lt"/>
+                <a:ea typeface="+mn-ea"/>
+                <a:cs typeface="+mn-cs"/>
+              </a:defRPr>
+            </a:lvl9pPr>
+          </a:lstStyle>
+          <a:p>
+            <a:r>
+              <a:rPr lang="zh-CN" altLang="en-US" dirty="0"/>
+              <a:t>输入层</a:t>
+            </a:r>
+          </a:p>
+        </p:txBody>
+      </p:sp>
+      <p:sp>
+        <p:nvSpPr>
+          <p:cNvPr id="9" name="文本框 8"/>
+          <p:cNvSpPr txBox="1"/>
+          <p:nvPr/>
+        </p:nvSpPr>
+        <p:spPr>
+          <a:xfrm>
+            <a:off x="3831750" y="109837"/>
+            <a:ext cx="877163" cy="369332"/>
+          </a:xfrm>
+          <a:prstGeom prst="rect">
+            <a:avLst/>
+          </a:prstGeom>
+          <a:noFill/>
+        </p:spPr>
+        <p:txBody>
+          <a:bodyPr wrap="none" rtlCol="0">
+            <a:spAutoFit/>
+          </a:bodyPr>
+          <a:lstStyle>
+            <a:defPPr>
+              <a:defRPr lang="zh-CN"/>
+            </a:defPPr>
+            <a:lvl1pPr marL="0" algn="l" defTabSz="914400" rtl="0" eaLnBrk="1" latinLnBrk="0" hangingPunct="1">
+              <a:defRPr sz="1800" kern="1200">
+                <a:solidFill>
+                  <a:schemeClr val="tx1"/>
+                </a:solidFill>
+                <a:latin typeface="+mn-lt"/>
+                <a:ea typeface="+mn-ea"/>
+                <a:cs typeface="+mn-cs"/>
+              </a:defRPr>
+            </a:lvl1pPr>
+            <a:lvl2pPr marL="457200" algn="l" defTabSz="914400" rtl="0" eaLnBrk="1" latinLnBrk="0" hangingPunct="1">
+              <a:defRPr sz="1800" kern="1200">
+                <a:solidFill>
+                  <a:schemeClr val="tx1"/>
+                </a:solidFill>
+                <a:latin typeface="+mn-lt"/>
+                <a:ea typeface="+mn-ea"/>
+                <a:cs typeface="+mn-cs"/>
+              </a:defRPr>
+            </a:lvl2pPr>
+            <a:lvl3pPr marL="914400" algn="l" defTabSz="914400" rtl="0" eaLnBrk="1" latinLnBrk="0" hangingPunct="1">
+              <a:defRPr sz="1800" kern="1200">
+                <a:solidFill>
+                  <a:schemeClr val="tx1"/>
+                </a:solidFill>
+                <a:latin typeface="+mn-lt"/>
+                <a:ea typeface="+mn-ea"/>
+                <a:cs typeface="+mn-cs"/>
+              </a:defRPr>
+            </a:lvl3pPr>
+            <a:lvl4pPr marL="1371600" algn="l" defTabSz="914400" rtl="0" eaLnBrk="1" latinLnBrk="0" hangingPunct="1">
+              <a:defRPr sz="1800" kern="1200">
+                <a:solidFill>
+                  <a:schemeClr val="tx1"/>
+                </a:solidFill>
+                <a:latin typeface="+mn-lt"/>
+                <a:ea typeface="+mn-ea"/>
+                <a:cs typeface="+mn-cs"/>
+              </a:defRPr>
+            </a:lvl4pPr>
+            <a:lvl5pPr marL="1828800" algn="l" defTabSz="914400" rtl="0" eaLnBrk="1" latinLnBrk="0" hangingPunct="1">
+              <a:defRPr sz="1800" kern="1200">
+                <a:solidFill>
+                  <a:schemeClr val="tx1"/>
+                </a:solidFill>
+                <a:latin typeface="+mn-lt"/>
+                <a:ea typeface="+mn-ea"/>
+                <a:cs typeface="+mn-cs"/>
+              </a:defRPr>
+            </a:lvl5pPr>
+            <a:lvl6pPr marL="2286000" algn="l" defTabSz="914400" rtl="0" eaLnBrk="1" latinLnBrk="0" hangingPunct="1">
+              <a:defRPr sz="1800" kern="1200">
+                <a:solidFill>
+                  <a:schemeClr val="tx1"/>
+                </a:solidFill>
+                <a:latin typeface="+mn-lt"/>
+                <a:ea typeface="+mn-ea"/>
+                <a:cs typeface="+mn-cs"/>
+              </a:defRPr>
+            </a:lvl6pPr>
+            <a:lvl7pPr marL="2743200" algn="l" defTabSz="914400" rtl="0" eaLnBrk="1" latinLnBrk="0" hangingPunct="1">
+              <a:defRPr sz="1800" kern="1200">
+                <a:solidFill>
+                  <a:schemeClr val="tx1"/>
+                </a:solidFill>
+                <a:latin typeface="+mn-lt"/>
+                <a:ea typeface="+mn-ea"/>
+                <a:cs typeface="+mn-cs"/>
+              </a:defRPr>
+            </a:lvl7pPr>
+            <a:lvl8pPr marL="3200400" algn="l" defTabSz="914400" rtl="0" eaLnBrk="1" latinLnBrk="0" hangingPunct="1">
+              <a:defRPr sz="1800" kern="1200">
+                <a:solidFill>
+                  <a:schemeClr val="tx1"/>
+                </a:solidFill>
+                <a:latin typeface="+mn-lt"/>
+                <a:ea typeface="+mn-ea"/>
+                <a:cs typeface="+mn-cs"/>
+              </a:defRPr>
+            </a:lvl8pPr>
+            <a:lvl9pPr marL="3657600" algn="l" defTabSz="914400" rtl="0" eaLnBrk="1" latinLnBrk="0" hangingPunct="1">
+              <a:defRPr sz="1800" kern="1200">
+                <a:solidFill>
+                  <a:schemeClr val="tx1"/>
+                </a:solidFill>
+                <a:latin typeface="+mn-lt"/>
+                <a:ea typeface="+mn-ea"/>
+                <a:cs typeface="+mn-cs"/>
+              </a:defRPr>
+            </a:lvl9pPr>
+          </a:lstStyle>
+          <a:p>
+            <a:r>
+              <a:rPr lang="zh-CN" altLang="en-US" dirty="0" smtClean="0"/>
+              <a:t>隐含层</a:t>
+            </a:r>
+            <a:endParaRPr lang="zh-CN" altLang="en-US" dirty="0"/>
+          </a:p>
+        </p:txBody>
+      </p:sp>
+      <p:sp>
+        <p:nvSpPr>
+          <p:cNvPr id="10" name="文本框 9"/>
+          <p:cNvSpPr txBox="1"/>
+          <p:nvPr/>
+        </p:nvSpPr>
+        <p:spPr>
+          <a:xfrm>
+            <a:off x="5472291" y="109837"/>
+            <a:ext cx="877163" cy="369332"/>
+          </a:xfrm>
+          <a:prstGeom prst="rect">
+            <a:avLst/>
+          </a:prstGeom>
+          <a:noFill/>
+        </p:spPr>
+        <p:txBody>
+          <a:bodyPr wrap="none" rtlCol="0">
+            <a:spAutoFit/>
+          </a:bodyPr>
+          <a:lstStyle>
+            <a:defPPr>
+              <a:defRPr lang="zh-CN"/>
+            </a:defPPr>
+            <a:lvl1pPr marL="0" algn="l" defTabSz="914400" rtl="0" eaLnBrk="1" latinLnBrk="0" hangingPunct="1">
+              <a:defRPr sz="1800" kern="1200">
+                <a:solidFill>
+                  <a:schemeClr val="tx1"/>
+                </a:solidFill>
+                <a:latin typeface="+mn-lt"/>
+                <a:ea typeface="+mn-ea"/>
+                <a:cs typeface="+mn-cs"/>
+              </a:defRPr>
+            </a:lvl1pPr>
+            <a:lvl2pPr marL="457200" algn="l" defTabSz="914400" rtl="0" eaLnBrk="1" latinLnBrk="0" hangingPunct="1">
+              <a:defRPr sz="1800" kern="1200">
+                <a:solidFill>
+                  <a:schemeClr val="tx1"/>
+                </a:solidFill>
+                <a:latin typeface="+mn-lt"/>
+                <a:ea typeface="+mn-ea"/>
+                <a:cs typeface="+mn-cs"/>
+              </a:defRPr>
+            </a:lvl2pPr>
+            <a:lvl3pPr marL="914400" algn="l" defTabSz="914400" rtl="0" eaLnBrk="1" latinLnBrk="0" hangingPunct="1">
+              <a:defRPr sz="1800" kern="1200">
+                <a:solidFill>
+                  <a:schemeClr val="tx1"/>
+                </a:solidFill>
+                <a:latin typeface="+mn-lt"/>
+                <a:ea typeface="+mn-ea"/>
+                <a:cs typeface="+mn-cs"/>
+              </a:defRPr>
+            </a:lvl3pPr>
+            <a:lvl4pPr marL="1371600" algn="l" defTabSz="914400" rtl="0" eaLnBrk="1" latinLnBrk="0" hangingPunct="1">
+              <a:defRPr sz="1800" kern="1200">
+                <a:solidFill>
+                  <a:schemeClr val="tx1"/>
+                </a:solidFill>
+                <a:latin typeface="+mn-lt"/>
+                <a:ea typeface="+mn-ea"/>
+                <a:cs typeface="+mn-cs"/>
+              </a:defRPr>
+            </a:lvl4pPr>
+            <a:lvl5pPr marL="1828800" algn="l" defTabSz="914400" rtl="0" eaLnBrk="1" latinLnBrk="0" hangingPunct="1">
+              <a:defRPr sz="1800" kern="1200">
+                <a:solidFill>
+                  <a:schemeClr val="tx1"/>
+                </a:solidFill>
+                <a:latin typeface="+mn-lt"/>
+                <a:ea typeface="+mn-ea"/>
+                <a:cs typeface="+mn-cs"/>
+              </a:defRPr>
+            </a:lvl5pPr>
+            <a:lvl6pPr marL="2286000" algn="l" defTabSz="914400" rtl="0" eaLnBrk="1" latinLnBrk="0" hangingPunct="1">
+              <a:defRPr sz="1800" kern="1200">
+                <a:solidFill>
+                  <a:schemeClr val="tx1"/>
+                </a:solidFill>
+                <a:latin typeface="+mn-lt"/>
+                <a:ea typeface="+mn-ea"/>
+                <a:cs typeface="+mn-cs"/>
+              </a:defRPr>
+            </a:lvl6pPr>
+            <a:lvl7pPr marL="2743200" algn="l" defTabSz="914400" rtl="0" eaLnBrk="1" latinLnBrk="0" hangingPunct="1">
+              <a:defRPr sz="1800" kern="1200">
+                <a:solidFill>
+                  <a:schemeClr val="tx1"/>
+                </a:solidFill>
+                <a:latin typeface="+mn-lt"/>
+                <a:ea typeface="+mn-ea"/>
+                <a:cs typeface="+mn-cs"/>
+              </a:defRPr>
+            </a:lvl7pPr>
+            <a:lvl8pPr marL="3200400" algn="l" defTabSz="914400" rtl="0" eaLnBrk="1" latinLnBrk="0" hangingPunct="1">
+              <a:defRPr sz="1800" kern="1200">
+                <a:solidFill>
+                  <a:schemeClr val="tx1"/>
+                </a:solidFill>
+                <a:latin typeface="+mn-lt"/>
+                <a:ea typeface="+mn-ea"/>
+                <a:cs typeface="+mn-cs"/>
+              </a:defRPr>
+            </a:lvl8pPr>
+            <a:lvl9pPr marL="3657600" algn="l" defTabSz="914400" rtl="0" eaLnBrk="1" latinLnBrk="0" hangingPunct="1">
+              <a:defRPr sz="1800" kern="1200">
+                <a:solidFill>
+                  <a:schemeClr val="tx1"/>
+                </a:solidFill>
+                <a:latin typeface="+mn-lt"/>
+                <a:ea typeface="+mn-ea"/>
+                <a:cs typeface="+mn-cs"/>
+              </a:defRPr>
+            </a:lvl9pPr>
+          </a:lstStyle>
+          <a:p>
+            <a:r>
+              <a:rPr lang="zh-CN" altLang="en-US" dirty="0" smtClean="0"/>
+              <a:t>隐含层</a:t>
+            </a:r>
+            <a:endParaRPr lang="zh-CN" altLang="en-US" dirty="0"/>
+          </a:p>
+        </p:txBody>
+      </p:sp>
+      <p:sp>
+        <p:nvSpPr>
+          <p:cNvPr id="11" name="文本框 10"/>
+          <p:cNvSpPr txBox="1"/>
+          <p:nvPr/>
+        </p:nvSpPr>
+        <p:spPr>
+          <a:xfrm>
+            <a:off x="7126740" y="1390899"/>
+            <a:ext cx="877163" cy="369332"/>
+          </a:xfrm>
+          <a:prstGeom prst="rect">
+            <a:avLst/>
+          </a:prstGeom>
+          <a:noFill/>
+        </p:spPr>
+        <p:txBody>
+          <a:bodyPr wrap="none" rtlCol="0">
+            <a:spAutoFit/>
+          </a:bodyPr>
+          <a:lstStyle>
+            <a:defPPr>
+              <a:defRPr lang="zh-CN"/>
+            </a:defPPr>
+            <a:lvl1pPr marL="0" algn="l" defTabSz="914400" rtl="0" eaLnBrk="1" latinLnBrk="0" hangingPunct="1">
+              <a:defRPr sz="1800" kern="1200">
+                <a:solidFill>
+                  <a:schemeClr val="tx1"/>
+                </a:solidFill>
+                <a:latin typeface="+mn-lt"/>
+                <a:ea typeface="+mn-ea"/>
+                <a:cs typeface="+mn-cs"/>
+              </a:defRPr>
+            </a:lvl1pPr>
+            <a:lvl2pPr marL="457200" algn="l" defTabSz="914400" rtl="0" eaLnBrk="1" latinLnBrk="0" hangingPunct="1">
+              <a:defRPr sz="1800" kern="1200">
+                <a:solidFill>
+                  <a:schemeClr val="tx1"/>
+                </a:solidFill>
+                <a:latin typeface="+mn-lt"/>
+                <a:ea typeface="+mn-ea"/>
+                <a:cs typeface="+mn-cs"/>
+              </a:defRPr>
+            </a:lvl2pPr>
+            <a:lvl3pPr marL="914400" algn="l" defTabSz="914400" rtl="0" eaLnBrk="1" latinLnBrk="0" hangingPunct="1">
+              <a:defRPr sz="1800" kern="1200">
+                <a:solidFill>
+                  <a:schemeClr val="tx1"/>
+                </a:solidFill>
+                <a:latin typeface="+mn-lt"/>
+                <a:ea typeface="+mn-ea"/>
+                <a:cs typeface="+mn-cs"/>
+              </a:defRPr>
+            </a:lvl3pPr>
+            <a:lvl4pPr marL="1371600" algn="l" defTabSz="914400" rtl="0" eaLnBrk="1" latinLnBrk="0" hangingPunct="1">
+              <a:defRPr sz="1800" kern="1200">
+                <a:solidFill>
+                  <a:schemeClr val="tx1"/>
+                </a:solidFill>
+                <a:latin typeface="+mn-lt"/>
+                <a:ea typeface="+mn-ea"/>
+                <a:cs typeface="+mn-cs"/>
+              </a:defRPr>
+            </a:lvl4pPr>
+            <a:lvl5pPr marL="1828800" algn="l" defTabSz="914400" rtl="0" eaLnBrk="1" latinLnBrk="0" hangingPunct="1">
+              <a:defRPr sz="1800" kern="1200">
+                <a:solidFill>
+                  <a:schemeClr val="tx1"/>
+                </a:solidFill>
+                <a:latin typeface="+mn-lt"/>
+                <a:ea typeface="+mn-ea"/>
+                <a:cs typeface="+mn-cs"/>
+              </a:defRPr>
+            </a:lvl5pPr>
+            <a:lvl6pPr marL="2286000" algn="l" defTabSz="914400" rtl="0" eaLnBrk="1" latinLnBrk="0" hangingPunct="1">
+              <a:defRPr sz="1800" kern="1200">
+                <a:solidFill>
+                  <a:schemeClr val="tx1"/>
+                </a:solidFill>
+                <a:latin typeface="+mn-lt"/>
+                <a:ea typeface="+mn-ea"/>
+                <a:cs typeface="+mn-cs"/>
+              </a:defRPr>
+            </a:lvl6pPr>
+            <a:lvl7pPr marL="2743200" algn="l" defTabSz="914400" rtl="0" eaLnBrk="1" latinLnBrk="0" hangingPunct="1">
+              <a:defRPr sz="1800" kern="1200">
+                <a:solidFill>
+                  <a:schemeClr val="tx1"/>
+                </a:solidFill>
+                <a:latin typeface="+mn-lt"/>
+                <a:ea typeface="+mn-ea"/>
+                <a:cs typeface="+mn-cs"/>
+              </a:defRPr>
+            </a:lvl7pPr>
+            <a:lvl8pPr marL="3200400" algn="l" defTabSz="914400" rtl="0" eaLnBrk="1" latinLnBrk="0" hangingPunct="1">
+              <a:defRPr sz="1800" kern="1200">
+                <a:solidFill>
+                  <a:schemeClr val="tx1"/>
+                </a:solidFill>
+                <a:latin typeface="+mn-lt"/>
+                <a:ea typeface="+mn-ea"/>
+                <a:cs typeface="+mn-cs"/>
+              </a:defRPr>
+            </a:lvl8pPr>
+            <a:lvl9pPr marL="3657600" algn="l" defTabSz="914400" rtl="0" eaLnBrk="1" latinLnBrk="0" hangingPunct="1">
+              <a:defRPr sz="1800" kern="1200">
+                <a:solidFill>
+                  <a:schemeClr val="tx1"/>
+                </a:solidFill>
+                <a:latin typeface="+mn-lt"/>
+                <a:ea typeface="+mn-ea"/>
+                <a:cs typeface="+mn-cs"/>
+              </a:defRPr>
+            </a:lvl9pPr>
+          </a:lstStyle>
+          <a:p>
+            <a:r>
+              <a:rPr lang="zh-CN" altLang="en-US" dirty="0" smtClean="0"/>
+              <a:t>输出层</a:t>
+            </a:r>
+            <a:endParaRPr lang="zh-CN" altLang="en-US" dirty="0"/>
+          </a:p>
+        </p:txBody>
+      </p:sp>
+      <p:sp>
+        <p:nvSpPr>
+          <p:cNvPr id="13" name="文本框 12"/>
+          <p:cNvSpPr txBox="1"/>
+          <p:nvPr/>
+        </p:nvSpPr>
+        <p:spPr>
+          <a:xfrm>
+            <a:off x="3580063" y="4212109"/>
+            <a:ext cx="535724" cy="369332"/>
+          </a:xfrm>
+          <a:prstGeom prst="rect">
+            <a:avLst/>
+          </a:prstGeom>
+          <a:noFill/>
+        </p:spPr>
+        <p:txBody>
+          <a:bodyPr wrap="none" rtlCol="0">
+            <a:spAutoFit/>
+          </a:bodyPr>
+          <a:lstStyle>
+            <a:defPPr>
+              <a:defRPr lang="zh-CN"/>
+            </a:defPPr>
+            <a:lvl1pPr marL="0" algn="l" defTabSz="914400" rtl="0" eaLnBrk="1" latinLnBrk="0" hangingPunct="1">
+              <a:defRPr sz="1800" kern="1200">
+                <a:solidFill>
+                  <a:schemeClr val="tx1"/>
+                </a:solidFill>
+                <a:latin typeface="+mn-lt"/>
+                <a:ea typeface="+mn-ea"/>
+                <a:cs typeface="+mn-cs"/>
+              </a:defRPr>
+            </a:lvl1pPr>
+            <a:lvl2pPr marL="457200" algn="l" defTabSz="914400" rtl="0" eaLnBrk="1" latinLnBrk="0" hangingPunct="1">
+              <a:defRPr sz="1800" kern="1200">
+                <a:solidFill>
+                  <a:schemeClr val="tx1"/>
+                </a:solidFill>
+                <a:latin typeface="+mn-lt"/>
+                <a:ea typeface="+mn-ea"/>
+                <a:cs typeface="+mn-cs"/>
+              </a:defRPr>
+            </a:lvl2pPr>
+            <a:lvl3pPr marL="914400" algn="l" defTabSz="914400" rtl="0" eaLnBrk="1" latinLnBrk="0" hangingPunct="1">
+              <a:defRPr sz="1800" kern="1200">
+                <a:solidFill>
+                  <a:schemeClr val="tx1"/>
+                </a:solidFill>
+                <a:latin typeface="+mn-lt"/>
+                <a:ea typeface="+mn-ea"/>
+                <a:cs typeface="+mn-cs"/>
+              </a:defRPr>
+            </a:lvl3pPr>
+            <a:lvl4pPr marL="1371600" algn="l" defTabSz="914400" rtl="0" eaLnBrk="1" latinLnBrk="0" hangingPunct="1">
+              <a:defRPr sz="1800" kern="1200">
+                <a:solidFill>
+                  <a:schemeClr val="tx1"/>
+                </a:solidFill>
+                <a:latin typeface="+mn-lt"/>
+                <a:ea typeface="+mn-ea"/>
+                <a:cs typeface="+mn-cs"/>
+              </a:defRPr>
+            </a:lvl4pPr>
+            <a:lvl5pPr marL="1828800" algn="l" defTabSz="914400" rtl="0" eaLnBrk="1" latinLnBrk="0" hangingPunct="1">
+              <a:defRPr sz="1800" kern="1200">
+                <a:solidFill>
+                  <a:schemeClr val="tx1"/>
+                </a:solidFill>
+                <a:latin typeface="+mn-lt"/>
+                <a:ea typeface="+mn-ea"/>
+                <a:cs typeface="+mn-cs"/>
+              </a:defRPr>
+            </a:lvl5pPr>
+            <a:lvl6pPr marL="2286000" algn="l" defTabSz="914400" rtl="0" eaLnBrk="1" latinLnBrk="0" hangingPunct="1">
+              <a:defRPr sz="1800" kern="1200">
+                <a:solidFill>
+                  <a:schemeClr val="tx1"/>
+                </a:solidFill>
+                <a:latin typeface="+mn-lt"/>
+                <a:ea typeface="+mn-ea"/>
+                <a:cs typeface="+mn-cs"/>
+              </a:defRPr>
+            </a:lvl6pPr>
+            <a:lvl7pPr marL="2743200" algn="l" defTabSz="914400" rtl="0" eaLnBrk="1" latinLnBrk="0" hangingPunct="1">
+              <a:defRPr sz="1800" kern="1200">
+                <a:solidFill>
+                  <a:schemeClr val="tx1"/>
+                </a:solidFill>
+                <a:latin typeface="+mn-lt"/>
+                <a:ea typeface="+mn-ea"/>
+                <a:cs typeface="+mn-cs"/>
+              </a:defRPr>
+            </a:lvl7pPr>
+            <a:lvl8pPr marL="3200400" algn="l" defTabSz="914400" rtl="0" eaLnBrk="1" latinLnBrk="0" hangingPunct="1">
+              <a:defRPr sz="1800" kern="1200">
+                <a:solidFill>
+                  <a:schemeClr val="tx1"/>
+                </a:solidFill>
+                <a:latin typeface="+mn-lt"/>
+                <a:ea typeface="+mn-ea"/>
+                <a:cs typeface="+mn-cs"/>
+              </a:defRPr>
+            </a:lvl8pPr>
+            <a:lvl9pPr marL="3657600" algn="l" defTabSz="914400" rtl="0" eaLnBrk="1" latinLnBrk="0" hangingPunct="1">
+              <a:defRPr sz="1800" kern="1200">
+                <a:solidFill>
+                  <a:schemeClr val="tx1"/>
+                </a:solidFill>
+                <a:latin typeface="+mn-lt"/>
+                <a:ea typeface="+mn-ea"/>
+                <a:cs typeface="+mn-cs"/>
+              </a:defRPr>
+            </a:lvl9pPr>
+          </a:lstStyle>
+          <a:p>
+            <a:r>
+              <a:rPr lang="en-US" altLang="zh-CN" dirty="0" smtClean="0"/>
+              <a:t>512</a:t>
+            </a:r>
+            <a:endParaRPr lang="zh-CN" altLang="en-US" dirty="0"/>
+          </a:p>
+        </p:txBody>
+      </p:sp>
+      <p:sp>
+        <p:nvSpPr>
+          <p:cNvPr id="15" name="文本框 14"/>
+          <p:cNvSpPr txBox="1"/>
+          <p:nvPr/>
+        </p:nvSpPr>
+        <p:spPr>
+          <a:xfrm>
+            <a:off x="7309827" y="3713647"/>
+            <a:ext cx="418704" cy="369332"/>
+          </a:xfrm>
+          <a:prstGeom prst="rect">
+            <a:avLst/>
+          </a:prstGeom>
+          <a:noFill/>
+        </p:spPr>
+        <p:txBody>
+          <a:bodyPr wrap="none" rtlCol="0">
+            <a:spAutoFit/>
+          </a:bodyPr>
+          <a:lstStyle>
+            <a:defPPr>
+              <a:defRPr lang="zh-CN"/>
+            </a:defPPr>
+            <a:lvl1pPr marL="0" algn="l" defTabSz="914400" rtl="0" eaLnBrk="1" latinLnBrk="0" hangingPunct="1">
+              <a:defRPr sz="1800" kern="1200">
+                <a:solidFill>
+                  <a:schemeClr val="tx1"/>
+                </a:solidFill>
+                <a:latin typeface="+mn-lt"/>
+                <a:ea typeface="+mn-ea"/>
+                <a:cs typeface="+mn-cs"/>
+              </a:defRPr>
+            </a:lvl1pPr>
+            <a:lvl2pPr marL="457200" algn="l" defTabSz="914400" rtl="0" eaLnBrk="1" latinLnBrk="0" hangingPunct="1">
+              <a:defRPr sz="1800" kern="1200">
+                <a:solidFill>
+                  <a:schemeClr val="tx1"/>
+                </a:solidFill>
+                <a:latin typeface="+mn-lt"/>
+                <a:ea typeface="+mn-ea"/>
+                <a:cs typeface="+mn-cs"/>
+              </a:defRPr>
+            </a:lvl2pPr>
+            <a:lvl3pPr marL="914400" algn="l" defTabSz="914400" rtl="0" eaLnBrk="1" latinLnBrk="0" hangingPunct="1">
+              <a:defRPr sz="1800" kern="1200">
+                <a:solidFill>
+                  <a:schemeClr val="tx1"/>
+                </a:solidFill>
+                <a:latin typeface="+mn-lt"/>
+                <a:ea typeface="+mn-ea"/>
+                <a:cs typeface="+mn-cs"/>
+              </a:defRPr>
+            </a:lvl3pPr>
+            <a:lvl4pPr marL="1371600" algn="l" defTabSz="914400" rtl="0" eaLnBrk="1" latinLnBrk="0" hangingPunct="1">
+              <a:defRPr sz="1800" kern="1200">
+                <a:solidFill>
+                  <a:schemeClr val="tx1"/>
+                </a:solidFill>
+                <a:latin typeface="+mn-lt"/>
+                <a:ea typeface="+mn-ea"/>
+                <a:cs typeface="+mn-cs"/>
+              </a:defRPr>
+            </a:lvl4pPr>
+            <a:lvl5pPr marL="1828800" algn="l" defTabSz="914400" rtl="0" eaLnBrk="1" latinLnBrk="0" hangingPunct="1">
+              <a:defRPr sz="1800" kern="1200">
+                <a:solidFill>
+                  <a:schemeClr val="tx1"/>
+                </a:solidFill>
+                <a:latin typeface="+mn-lt"/>
+                <a:ea typeface="+mn-ea"/>
+                <a:cs typeface="+mn-cs"/>
+              </a:defRPr>
+            </a:lvl5pPr>
+            <a:lvl6pPr marL="2286000" algn="l" defTabSz="914400" rtl="0" eaLnBrk="1" latinLnBrk="0" hangingPunct="1">
+              <a:defRPr sz="1800" kern="1200">
+                <a:solidFill>
+                  <a:schemeClr val="tx1"/>
+                </a:solidFill>
+                <a:latin typeface="+mn-lt"/>
+                <a:ea typeface="+mn-ea"/>
+                <a:cs typeface="+mn-cs"/>
+              </a:defRPr>
+            </a:lvl6pPr>
+            <a:lvl7pPr marL="2743200" algn="l" defTabSz="914400" rtl="0" eaLnBrk="1" latinLnBrk="0" hangingPunct="1">
+              <a:defRPr sz="1800" kern="1200">
+                <a:solidFill>
+                  <a:schemeClr val="tx1"/>
+                </a:solidFill>
+                <a:latin typeface="+mn-lt"/>
+                <a:ea typeface="+mn-ea"/>
+                <a:cs typeface="+mn-cs"/>
+              </a:defRPr>
+            </a:lvl7pPr>
+            <a:lvl8pPr marL="3200400" algn="l" defTabSz="914400" rtl="0" eaLnBrk="1" latinLnBrk="0" hangingPunct="1">
+              <a:defRPr sz="1800" kern="1200">
+                <a:solidFill>
+                  <a:schemeClr val="tx1"/>
+                </a:solidFill>
+                <a:latin typeface="+mn-lt"/>
+                <a:ea typeface="+mn-ea"/>
+                <a:cs typeface="+mn-cs"/>
+              </a:defRPr>
+            </a:lvl8pPr>
+            <a:lvl9pPr marL="3657600" algn="l" defTabSz="914400" rtl="0" eaLnBrk="1" latinLnBrk="0" hangingPunct="1">
+              <a:defRPr sz="1800" kern="1200">
+                <a:solidFill>
+                  <a:schemeClr val="tx1"/>
+                </a:solidFill>
+                <a:latin typeface="+mn-lt"/>
+                <a:ea typeface="+mn-ea"/>
+                <a:cs typeface="+mn-cs"/>
+              </a:defRPr>
+            </a:lvl9pPr>
+          </a:lstStyle>
+          <a:p>
+            <a:r>
+              <a:rPr lang="en-US" altLang="zh-CN" dirty="0" smtClean="0"/>
+              <a:t>10</a:t>
+            </a:r>
+            <a:endParaRPr lang="zh-CN" altLang="en-US" dirty="0"/>
+          </a:p>
+        </p:txBody>
+      </p:sp>
+      <p:sp>
+        <p:nvSpPr>
+          <p:cNvPr id="16" name="右箭头 15"/>
+          <p:cNvSpPr/>
+          <p:nvPr/>
+        </p:nvSpPr>
+        <p:spPr>
+          <a:xfrm>
+            <a:off x="3036767" y="1638287"/>
+            <a:ext cx="811158" cy="255491"/>
+          </a:xfrm>
+          <a:prstGeom prst="rightArrow">
+            <a:avLst/>
+          </a:prstGeom>
+        </p:spPr>
+        <p:style>
+          <a:lnRef idx="2">
+            <a:schemeClr val="accent1">
+              <a:shade val="50000"/>
+            </a:schemeClr>
+          </a:lnRef>
+          <a:fillRef idx="1">
+            <a:schemeClr val="accent1"/>
+          </a:fillRef>
+          <a:effectRef idx="0">
+            <a:schemeClr val="accent1"/>
+          </a:effectRef>
+          <a:fontRef idx="minor">
+            <a:schemeClr val="lt1"/>
+          </a:fontRef>
+        </p:style>
+        <p:txBody>
+          <a:bodyPr rtlCol="0" anchor="ctr"/>
+          <a:lstStyle>
+            <a:defPPr>
+              <a:defRPr lang="zh-CN"/>
+            </a:defPPr>
+            <a:lvl1pPr marL="0" algn="l" defTabSz="914400" rtl="0" eaLnBrk="1" latinLnBrk="0" hangingPunct="1">
+              <a:defRPr sz="1800" kern="1200">
+                <a:solidFill>
+                  <a:schemeClr val="lt1"/>
+                </a:solidFill>
+                <a:latin typeface="+mn-lt"/>
+                <a:ea typeface="+mn-ea"/>
+                <a:cs typeface="+mn-cs"/>
+              </a:defRPr>
+            </a:lvl1pPr>
+            <a:lvl2pPr marL="457200" algn="l" defTabSz="914400" rtl="0" eaLnBrk="1" latinLnBrk="0" hangingPunct="1">
+              <a:defRPr sz="1800" kern="1200">
+                <a:solidFill>
+                  <a:schemeClr val="lt1"/>
+                </a:solidFill>
+                <a:latin typeface="+mn-lt"/>
+                <a:ea typeface="+mn-ea"/>
+                <a:cs typeface="+mn-cs"/>
+              </a:defRPr>
+            </a:lvl2pPr>
+            <a:lvl3pPr marL="914400" algn="l" defTabSz="914400" rtl="0" eaLnBrk="1" latinLnBrk="0" hangingPunct="1">
+              <a:defRPr sz="1800" kern="1200">
+                <a:solidFill>
+                  <a:schemeClr val="lt1"/>
+                </a:solidFill>
+                <a:latin typeface="+mn-lt"/>
+                <a:ea typeface="+mn-ea"/>
+                <a:cs typeface="+mn-cs"/>
+              </a:defRPr>
+            </a:lvl3pPr>
+            <a:lvl4pPr marL="1371600" algn="l" defTabSz="914400" rtl="0" eaLnBrk="1" latinLnBrk="0" hangingPunct="1">
+              <a:defRPr sz="1800" kern="1200">
+                <a:solidFill>
+                  <a:schemeClr val="lt1"/>
+                </a:solidFill>
+                <a:latin typeface="+mn-lt"/>
+                <a:ea typeface="+mn-ea"/>
+                <a:cs typeface="+mn-cs"/>
+              </a:defRPr>
+            </a:lvl4pPr>
+            <a:lvl5pPr marL="1828800" algn="l" defTabSz="914400" rtl="0" eaLnBrk="1" latinLnBrk="0" hangingPunct="1">
+              <a:defRPr sz="1800" kern="1200">
+                <a:solidFill>
+                  <a:schemeClr val="lt1"/>
+                </a:solidFill>
+                <a:latin typeface="+mn-lt"/>
+                <a:ea typeface="+mn-ea"/>
+                <a:cs typeface="+mn-cs"/>
+              </a:defRPr>
+            </a:lvl5pPr>
+            <a:lvl6pPr marL="2286000" algn="l" defTabSz="914400" rtl="0" eaLnBrk="1" latinLnBrk="0" hangingPunct="1">
+              <a:defRPr sz="1800" kern="1200">
+                <a:solidFill>
+                  <a:schemeClr val="lt1"/>
+                </a:solidFill>
+                <a:latin typeface="+mn-lt"/>
+                <a:ea typeface="+mn-ea"/>
+                <a:cs typeface="+mn-cs"/>
+              </a:defRPr>
+            </a:lvl6pPr>
+            <a:lvl7pPr marL="2743200" algn="l" defTabSz="914400" rtl="0" eaLnBrk="1" latinLnBrk="0" hangingPunct="1">
+              <a:defRPr sz="1800" kern="1200">
+                <a:solidFill>
+                  <a:schemeClr val="lt1"/>
+                </a:solidFill>
+                <a:latin typeface="+mn-lt"/>
+                <a:ea typeface="+mn-ea"/>
+                <a:cs typeface="+mn-cs"/>
+              </a:defRPr>
+            </a:lvl7pPr>
+            <a:lvl8pPr marL="3200400" algn="l" defTabSz="914400" rtl="0" eaLnBrk="1" latinLnBrk="0" hangingPunct="1">
+              <a:defRPr sz="1800" kern="1200">
+                <a:solidFill>
+                  <a:schemeClr val="lt1"/>
+                </a:solidFill>
+                <a:latin typeface="+mn-lt"/>
+                <a:ea typeface="+mn-ea"/>
+                <a:cs typeface="+mn-cs"/>
+              </a:defRPr>
+            </a:lvl8pPr>
+            <a:lvl9pPr marL="3657600" algn="l" defTabSz="914400" rtl="0" eaLnBrk="1" latinLnBrk="0" hangingPunct="1">
+              <a:defRPr sz="1800" kern="1200">
+                <a:solidFill>
+                  <a:schemeClr val="lt1"/>
+                </a:solidFill>
+                <a:latin typeface="+mn-lt"/>
+                <a:ea typeface="+mn-ea"/>
+                <a:cs typeface="+mn-cs"/>
+              </a:defRPr>
+            </a:lvl9pPr>
+          </a:lstStyle>
+          <a:p>
+            <a:pPr algn="ctr"/>
+            <a:endParaRPr lang="zh-CN" altLang="en-US"/>
+          </a:p>
+        </p:txBody>
+      </p:sp>
+      <p:sp>
+        <p:nvSpPr>
+          <p:cNvPr id="17" name="右箭头 16"/>
+          <p:cNvSpPr/>
+          <p:nvPr/>
+        </p:nvSpPr>
+        <p:spPr>
+          <a:xfrm>
+            <a:off x="4663099" y="1645472"/>
+            <a:ext cx="811158" cy="255491"/>
+          </a:xfrm>
+          <a:prstGeom prst="rightArrow">
+            <a:avLst/>
+          </a:prstGeom>
+        </p:spPr>
+        <p:style>
+          <a:lnRef idx="2">
+            <a:schemeClr val="accent1">
+              <a:shade val="50000"/>
+            </a:schemeClr>
+          </a:lnRef>
+          <a:fillRef idx="1">
+            <a:schemeClr val="accent1"/>
+          </a:fillRef>
+          <a:effectRef idx="0">
+            <a:schemeClr val="accent1"/>
+          </a:effectRef>
+          <a:fontRef idx="minor">
+            <a:schemeClr val="lt1"/>
+          </a:fontRef>
+        </p:style>
+        <p:txBody>
+          <a:bodyPr rtlCol="0" anchor="ctr"/>
+          <a:lstStyle>
+            <a:defPPr>
+              <a:defRPr lang="zh-CN"/>
+            </a:defPPr>
+            <a:lvl1pPr marL="0" algn="l" defTabSz="914400" rtl="0" eaLnBrk="1" latinLnBrk="0" hangingPunct="1">
+              <a:defRPr sz="1800" kern="1200">
+                <a:solidFill>
+                  <a:schemeClr val="lt1"/>
+                </a:solidFill>
+                <a:latin typeface="+mn-lt"/>
+                <a:ea typeface="+mn-ea"/>
+                <a:cs typeface="+mn-cs"/>
+              </a:defRPr>
+            </a:lvl1pPr>
+            <a:lvl2pPr marL="457200" algn="l" defTabSz="914400" rtl="0" eaLnBrk="1" latinLnBrk="0" hangingPunct="1">
+              <a:defRPr sz="1800" kern="1200">
+                <a:solidFill>
+                  <a:schemeClr val="lt1"/>
+                </a:solidFill>
+                <a:latin typeface="+mn-lt"/>
+                <a:ea typeface="+mn-ea"/>
+                <a:cs typeface="+mn-cs"/>
+              </a:defRPr>
+            </a:lvl2pPr>
+            <a:lvl3pPr marL="914400" algn="l" defTabSz="914400" rtl="0" eaLnBrk="1" latinLnBrk="0" hangingPunct="1">
+              <a:defRPr sz="1800" kern="1200">
+                <a:solidFill>
+                  <a:schemeClr val="lt1"/>
+                </a:solidFill>
+                <a:latin typeface="+mn-lt"/>
+                <a:ea typeface="+mn-ea"/>
+                <a:cs typeface="+mn-cs"/>
+              </a:defRPr>
+            </a:lvl3pPr>
+            <a:lvl4pPr marL="1371600" algn="l" defTabSz="914400" rtl="0" eaLnBrk="1" latinLnBrk="0" hangingPunct="1">
+              <a:defRPr sz="1800" kern="1200">
+                <a:solidFill>
+                  <a:schemeClr val="lt1"/>
+                </a:solidFill>
+                <a:latin typeface="+mn-lt"/>
+                <a:ea typeface="+mn-ea"/>
+                <a:cs typeface="+mn-cs"/>
+              </a:defRPr>
+            </a:lvl4pPr>
+            <a:lvl5pPr marL="1828800" algn="l" defTabSz="914400" rtl="0" eaLnBrk="1" latinLnBrk="0" hangingPunct="1">
+              <a:defRPr sz="1800" kern="1200">
+                <a:solidFill>
+                  <a:schemeClr val="lt1"/>
+                </a:solidFill>
+                <a:latin typeface="+mn-lt"/>
+                <a:ea typeface="+mn-ea"/>
+                <a:cs typeface="+mn-cs"/>
+              </a:defRPr>
+            </a:lvl5pPr>
+            <a:lvl6pPr marL="2286000" algn="l" defTabSz="914400" rtl="0" eaLnBrk="1" latinLnBrk="0" hangingPunct="1">
+              <a:defRPr sz="1800" kern="1200">
+                <a:solidFill>
+                  <a:schemeClr val="lt1"/>
+                </a:solidFill>
+                <a:latin typeface="+mn-lt"/>
+                <a:ea typeface="+mn-ea"/>
+                <a:cs typeface="+mn-cs"/>
+              </a:defRPr>
+            </a:lvl6pPr>
+            <a:lvl7pPr marL="2743200" algn="l" defTabSz="914400" rtl="0" eaLnBrk="1" latinLnBrk="0" hangingPunct="1">
+              <a:defRPr sz="1800" kern="1200">
+                <a:solidFill>
+                  <a:schemeClr val="lt1"/>
+                </a:solidFill>
+                <a:latin typeface="+mn-lt"/>
+                <a:ea typeface="+mn-ea"/>
+                <a:cs typeface="+mn-cs"/>
+              </a:defRPr>
+            </a:lvl7pPr>
+            <a:lvl8pPr marL="3200400" algn="l" defTabSz="914400" rtl="0" eaLnBrk="1" latinLnBrk="0" hangingPunct="1">
+              <a:defRPr sz="1800" kern="1200">
+                <a:solidFill>
+                  <a:schemeClr val="lt1"/>
+                </a:solidFill>
+                <a:latin typeface="+mn-lt"/>
+                <a:ea typeface="+mn-ea"/>
+                <a:cs typeface="+mn-cs"/>
+              </a:defRPr>
+            </a:lvl8pPr>
+            <a:lvl9pPr marL="3657600" algn="l" defTabSz="914400" rtl="0" eaLnBrk="1" latinLnBrk="0" hangingPunct="1">
+              <a:defRPr sz="1800" kern="1200">
+                <a:solidFill>
+                  <a:schemeClr val="lt1"/>
+                </a:solidFill>
+                <a:latin typeface="+mn-lt"/>
+                <a:ea typeface="+mn-ea"/>
+                <a:cs typeface="+mn-cs"/>
+              </a:defRPr>
+            </a:lvl9pPr>
+          </a:lstStyle>
+          <a:p>
+            <a:pPr algn="ctr"/>
+            <a:endParaRPr lang="zh-CN" altLang="en-US"/>
+          </a:p>
+        </p:txBody>
+      </p:sp>
+      <p:sp>
+        <p:nvSpPr>
+          <p:cNvPr id="18" name="右箭头 17"/>
+          <p:cNvSpPr/>
+          <p:nvPr/>
+        </p:nvSpPr>
+        <p:spPr>
+          <a:xfrm rot="2282265">
+            <a:off x="6166358" y="2089096"/>
+            <a:ext cx="1139498" cy="188593"/>
+          </a:xfrm>
+          <a:prstGeom prst="rightArrow">
+            <a:avLst/>
+          </a:prstGeom>
+        </p:spPr>
+        <p:style>
+          <a:lnRef idx="2">
+            <a:schemeClr val="accent1">
+              <a:shade val="50000"/>
+            </a:schemeClr>
+          </a:lnRef>
+          <a:fillRef idx="1">
+            <a:schemeClr val="accent1"/>
+          </a:fillRef>
+          <a:effectRef idx="0">
+            <a:schemeClr val="accent1"/>
+          </a:effectRef>
+          <a:fontRef idx="minor">
+            <a:schemeClr val="lt1"/>
+          </a:fontRef>
+        </p:style>
+        <p:txBody>
+          <a:bodyPr rtlCol="0" anchor="ctr"/>
+          <a:lstStyle>
+            <a:defPPr>
+              <a:defRPr lang="zh-CN"/>
+            </a:defPPr>
+            <a:lvl1pPr marL="0" algn="l" defTabSz="914400" rtl="0" eaLnBrk="1" latinLnBrk="0" hangingPunct="1">
+              <a:defRPr sz="1800" kern="1200">
+                <a:solidFill>
+                  <a:schemeClr val="lt1"/>
+                </a:solidFill>
+                <a:latin typeface="+mn-lt"/>
+                <a:ea typeface="+mn-ea"/>
+                <a:cs typeface="+mn-cs"/>
+              </a:defRPr>
+            </a:lvl1pPr>
+            <a:lvl2pPr marL="457200" algn="l" defTabSz="914400" rtl="0" eaLnBrk="1" latinLnBrk="0" hangingPunct="1">
+              <a:defRPr sz="1800" kern="1200">
+                <a:solidFill>
+                  <a:schemeClr val="lt1"/>
+                </a:solidFill>
+                <a:latin typeface="+mn-lt"/>
+                <a:ea typeface="+mn-ea"/>
+                <a:cs typeface="+mn-cs"/>
+              </a:defRPr>
+            </a:lvl2pPr>
+            <a:lvl3pPr marL="914400" algn="l" defTabSz="914400" rtl="0" eaLnBrk="1" latinLnBrk="0" hangingPunct="1">
+              <a:defRPr sz="1800" kern="1200">
+                <a:solidFill>
+                  <a:schemeClr val="lt1"/>
+                </a:solidFill>
+                <a:latin typeface="+mn-lt"/>
+                <a:ea typeface="+mn-ea"/>
+                <a:cs typeface="+mn-cs"/>
+              </a:defRPr>
+            </a:lvl3pPr>
+            <a:lvl4pPr marL="1371600" algn="l" defTabSz="914400" rtl="0" eaLnBrk="1" latinLnBrk="0" hangingPunct="1">
+              <a:defRPr sz="1800" kern="1200">
+                <a:solidFill>
+                  <a:schemeClr val="lt1"/>
+                </a:solidFill>
+                <a:latin typeface="+mn-lt"/>
+                <a:ea typeface="+mn-ea"/>
+                <a:cs typeface="+mn-cs"/>
+              </a:defRPr>
+            </a:lvl4pPr>
+            <a:lvl5pPr marL="1828800" algn="l" defTabSz="914400" rtl="0" eaLnBrk="1" latinLnBrk="0" hangingPunct="1">
+              <a:defRPr sz="1800" kern="1200">
+                <a:solidFill>
+                  <a:schemeClr val="lt1"/>
+                </a:solidFill>
+                <a:latin typeface="+mn-lt"/>
+                <a:ea typeface="+mn-ea"/>
+                <a:cs typeface="+mn-cs"/>
+              </a:defRPr>
+            </a:lvl5pPr>
+            <a:lvl6pPr marL="2286000" algn="l" defTabSz="914400" rtl="0" eaLnBrk="1" latinLnBrk="0" hangingPunct="1">
+              <a:defRPr sz="1800" kern="1200">
+                <a:solidFill>
+                  <a:schemeClr val="lt1"/>
+                </a:solidFill>
+                <a:latin typeface="+mn-lt"/>
+                <a:ea typeface="+mn-ea"/>
+                <a:cs typeface="+mn-cs"/>
+              </a:defRPr>
+            </a:lvl6pPr>
+            <a:lvl7pPr marL="2743200" algn="l" defTabSz="914400" rtl="0" eaLnBrk="1" latinLnBrk="0" hangingPunct="1">
+              <a:defRPr sz="1800" kern="1200">
+                <a:solidFill>
+                  <a:schemeClr val="lt1"/>
+                </a:solidFill>
+                <a:latin typeface="+mn-lt"/>
+                <a:ea typeface="+mn-ea"/>
+                <a:cs typeface="+mn-cs"/>
+              </a:defRPr>
+            </a:lvl7pPr>
+            <a:lvl8pPr marL="3200400" algn="l" defTabSz="914400" rtl="0" eaLnBrk="1" latinLnBrk="0" hangingPunct="1">
+              <a:defRPr sz="1800" kern="1200">
+                <a:solidFill>
+                  <a:schemeClr val="lt1"/>
+                </a:solidFill>
+                <a:latin typeface="+mn-lt"/>
+                <a:ea typeface="+mn-ea"/>
+                <a:cs typeface="+mn-cs"/>
+              </a:defRPr>
+            </a:lvl8pPr>
+            <a:lvl9pPr marL="3657600" algn="l" defTabSz="914400" rtl="0" eaLnBrk="1" latinLnBrk="0" hangingPunct="1">
+              <a:defRPr sz="1800" kern="1200">
+                <a:solidFill>
+                  <a:schemeClr val="lt1"/>
+                </a:solidFill>
+                <a:latin typeface="+mn-lt"/>
+                <a:ea typeface="+mn-ea"/>
+                <a:cs typeface="+mn-cs"/>
+              </a:defRPr>
+            </a:lvl9pPr>
+          </a:lstStyle>
+          <a:p>
+            <a:pPr algn="ctr"/>
+            <a:endParaRPr lang="zh-CN" altLang="en-US"/>
+          </a:p>
+        </p:txBody>
+      </p:sp>
+      <p:sp>
+        <p:nvSpPr>
+          <p:cNvPr id="19" name="文本框 18"/>
+          <p:cNvSpPr txBox="1"/>
+          <p:nvPr/>
+        </p:nvSpPr>
+        <p:spPr>
+          <a:xfrm>
+            <a:off x="2960616" y="1341956"/>
+            <a:ext cx="877163" cy="369332"/>
+          </a:xfrm>
+          <a:prstGeom prst="rect">
+            <a:avLst/>
+          </a:prstGeom>
+          <a:noFill/>
+        </p:spPr>
+        <p:txBody>
+          <a:bodyPr wrap="none" rtlCol="0">
+            <a:spAutoFit/>
+          </a:bodyPr>
+          <a:lstStyle>
+            <a:defPPr>
+              <a:defRPr lang="zh-CN"/>
+            </a:defPPr>
+            <a:lvl1pPr marL="0" algn="l" defTabSz="914400" rtl="0" eaLnBrk="1" latinLnBrk="0" hangingPunct="1">
+              <a:defRPr sz="1800" kern="1200">
+                <a:solidFill>
+                  <a:schemeClr val="tx1"/>
+                </a:solidFill>
+                <a:latin typeface="+mn-lt"/>
+                <a:ea typeface="+mn-ea"/>
+                <a:cs typeface="+mn-cs"/>
+              </a:defRPr>
+            </a:lvl1pPr>
+            <a:lvl2pPr marL="457200" algn="l" defTabSz="914400" rtl="0" eaLnBrk="1" latinLnBrk="0" hangingPunct="1">
+              <a:defRPr sz="1800" kern="1200">
+                <a:solidFill>
+                  <a:schemeClr val="tx1"/>
+                </a:solidFill>
+                <a:latin typeface="+mn-lt"/>
+                <a:ea typeface="+mn-ea"/>
+                <a:cs typeface="+mn-cs"/>
+              </a:defRPr>
+            </a:lvl2pPr>
+            <a:lvl3pPr marL="914400" algn="l" defTabSz="914400" rtl="0" eaLnBrk="1" latinLnBrk="0" hangingPunct="1">
+              <a:defRPr sz="1800" kern="1200">
+                <a:solidFill>
+                  <a:schemeClr val="tx1"/>
+                </a:solidFill>
+                <a:latin typeface="+mn-lt"/>
+                <a:ea typeface="+mn-ea"/>
+                <a:cs typeface="+mn-cs"/>
+              </a:defRPr>
+            </a:lvl3pPr>
+            <a:lvl4pPr marL="1371600" algn="l" defTabSz="914400" rtl="0" eaLnBrk="1" latinLnBrk="0" hangingPunct="1">
+              <a:defRPr sz="1800" kern="1200">
+                <a:solidFill>
+                  <a:schemeClr val="tx1"/>
+                </a:solidFill>
+                <a:latin typeface="+mn-lt"/>
+                <a:ea typeface="+mn-ea"/>
+                <a:cs typeface="+mn-cs"/>
+              </a:defRPr>
+            </a:lvl4pPr>
+            <a:lvl5pPr marL="1828800" algn="l" defTabSz="914400" rtl="0" eaLnBrk="1" latinLnBrk="0" hangingPunct="1">
+              <a:defRPr sz="1800" kern="1200">
+                <a:solidFill>
+                  <a:schemeClr val="tx1"/>
+                </a:solidFill>
+                <a:latin typeface="+mn-lt"/>
+                <a:ea typeface="+mn-ea"/>
+                <a:cs typeface="+mn-cs"/>
+              </a:defRPr>
+            </a:lvl5pPr>
+            <a:lvl6pPr marL="2286000" algn="l" defTabSz="914400" rtl="0" eaLnBrk="1" latinLnBrk="0" hangingPunct="1">
+              <a:defRPr sz="1800" kern="1200">
+                <a:solidFill>
+                  <a:schemeClr val="tx1"/>
+                </a:solidFill>
+                <a:latin typeface="+mn-lt"/>
+                <a:ea typeface="+mn-ea"/>
+                <a:cs typeface="+mn-cs"/>
+              </a:defRPr>
+            </a:lvl6pPr>
+            <a:lvl7pPr marL="2743200" algn="l" defTabSz="914400" rtl="0" eaLnBrk="1" latinLnBrk="0" hangingPunct="1">
+              <a:defRPr sz="1800" kern="1200">
+                <a:solidFill>
+                  <a:schemeClr val="tx1"/>
+                </a:solidFill>
+                <a:latin typeface="+mn-lt"/>
+                <a:ea typeface="+mn-ea"/>
+                <a:cs typeface="+mn-cs"/>
+              </a:defRPr>
+            </a:lvl7pPr>
+            <a:lvl8pPr marL="3200400" algn="l" defTabSz="914400" rtl="0" eaLnBrk="1" latinLnBrk="0" hangingPunct="1">
+              <a:defRPr sz="1800" kern="1200">
+                <a:solidFill>
+                  <a:schemeClr val="tx1"/>
+                </a:solidFill>
+                <a:latin typeface="+mn-lt"/>
+                <a:ea typeface="+mn-ea"/>
+                <a:cs typeface="+mn-cs"/>
+              </a:defRPr>
+            </a:lvl8pPr>
+            <a:lvl9pPr marL="3657600" algn="l" defTabSz="914400" rtl="0" eaLnBrk="1" latinLnBrk="0" hangingPunct="1">
+              <a:defRPr sz="1800" kern="1200">
+                <a:solidFill>
+                  <a:schemeClr val="tx1"/>
+                </a:solidFill>
+                <a:latin typeface="+mn-lt"/>
+                <a:ea typeface="+mn-ea"/>
+                <a:cs typeface="+mn-cs"/>
+              </a:defRPr>
+            </a:lvl9pPr>
+          </a:lstStyle>
+          <a:p>
+            <a:r>
+              <a:rPr lang="zh-CN" altLang="en-US" dirty="0" smtClean="0"/>
+              <a:t>全连接</a:t>
+            </a:r>
+            <a:endParaRPr lang="zh-CN" altLang="en-US" dirty="0"/>
+          </a:p>
+        </p:txBody>
+      </p:sp>
+      <p:sp>
+        <p:nvSpPr>
+          <p:cNvPr id="20" name="文本框 19"/>
+          <p:cNvSpPr txBox="1"/>
+          <p:nvPr/>
+        </p:nvSpPr>
+        <p:spPr>
+          <a:xfrm>
+            <a:off x="4609108" y="1383169"/>
+            <a:ext cx="877163" cy="369332"/>
+          </a:xfrm>
+          <a:prstGeom prst="rect">
+            <a:avLst/>
+          </a:prstGeom>
+          <a:noFill/>
+        </p:spPr>
+        <p:txBody>
+          <a:bodyPr wrap="none" rtlCol="0">
+            <a:spAutoFit/>
+          </a:bodyPr>
+          <a:lstStyle>
+            <a:defPPr>
+              <a:defRPr lang="zh-CN"/>
+            </a:defPPr>
+            <a:lvl1pPr marL="0" algn="l" defTabSz="914400" rtl="0" eaLnBrk="1" latinLnBrk="0" hangingPunct="1">
+              <a:defRPr sz="1800" kern="1200">
+                <a:solidFill>
+                  <a:schemeClr val="tx1"/>
+                </a:solidFill>
+                <a:latin typeface="+mn-lt"/>
+                <a:ea typeface="+mn-ea"/>
+                <a:cs typeface="+mn-cs"/>
+              </a:defRPr>
+            </a:lvl1pPr>
+            <a:lvl2pPr marL="457200" algn="l" defTabSz="914400" rtl="0" eaLnBrk="1" latinLnBrk="0" hangingPunct="1">
+              <a:defRPr sz="1800" kern="1200">
+                <a:solidFill>
+                  <a:schemeClr val="tx1"/>
+                </a:solidFill>
+                <a:latin typeface="+mn-lt"/>
+                <a:ea typeface="+mn-ea"/>
+                <a:cs typeface="+mn-cs"/>
+              </a:defRPr>
+            </a:lvl2pPr>
+            <a:lvl3pPr marL="914400" algn="l" defTabSz="914400" rtl="0" eaLnBrk="1" latinLnBrk="0" hangingPunct="1">
+              <a:defRPr sz="1800" kern="1200">
+                <a:solidFill>
+                  <a:schemeClr val="tx1"/>
+                </a:solidFill>
+                <a:latin typeface="+mn-lt"/>
+                <a:ea typeface="+mn-ea"/>
+                <a:cs typeface="+mn-cs"/>
+              </a:defRPr>
+            </a:lvl3pPr>
+            <a:lvl4pPr marL="1371600" algn="l" defTabSz="914400" rtl="0" eaLnBrk="1" latinLnBrk="0" hangingPunct="1">
+              <a:defRPr sz="1800" kern="1200">
+                <a:solidFill>
+                  <a:schemeClr val="tx1"/>
+                </a:solidFill>
+                <a:latin typeface="+mn-lt"/>
+                <a:ea typeface="+mn-ea"/>
+                <a:cs typeface="+mn-cs"/>
+              </a:defRPr>
+            </a:lvl4pPr>
+            <a:lvl5pPr marL="1828800" algn="l" defTabSz="914400" rtl="0" eaLnBrk="1" latinLnBrk="0" hangingPunct="1">
+              <a:defRPr sz="1800" kern="1200">
+                <a:solidFill>
+                  <a:schemeClr val="tx1"/>
+                </a:solidFill>
+                <a:latin typeface="+mn-lt"/>
+                <a:ea typeface="+mn-ea"/>
+                <a:cs typeface="+mn-cs"/>
+              </a:defRPr>
+            </a:lvl5pPr>
+            <a:lvl6pPr marL="2286000" algn="l" defTabSz="914400" rtl="0" eaLnBrk="1" latinLnBrk="0" hangingPunct="1">
+              <a:defRPr sz="1800" kern="1200">
+                <a:solidFill>
+                  <a:schemeClr val="tx1"/>
+                </a:solidFill>
+                <a:latin typeface="+mn-lt"/>
+                <a:ea typeface="+mn-ea"/>
+                <a:cs typeface="+mn-cs"/>
+              </a:defRPr>
+            </a:lvl6pPr>
+            <a:lvl7pPr marL="2743200" algn="l" defTabSz="914400" rtl="0" eaLnBrk="1" latinLnBrk="0" hangingPunct="1">
+              <a:defRPr sz="1800" kern="1200">
+                <a:solidFill>
+                  <a:schemeClr val="tx1"/>
+                </a:solidFill>
+                <a:latin typeface="+mn-lt"/>
+                <a:ea typeface="+mn-ea"/>
+                <a:cs typeface="+mn-cs"/>
+              </a:defRPr>
+            </a:lvl7pPr>
+            <a:lvl8pPr marL="3200400" algn="l" defTabSz="914400" rtl="0" eaLnBrk="1" latinLnBrk="0" hangingPunct="1">
+              <a:defRPr sz="1800" kern="1200">
+                <a:solidFill>
+                  <a:schemeClr val="tx1"/>
+                </a:solidFill>
+                <a:latin typeface="+mn-lt"/>
+                <a:ea typeface="+mn-ea"/>
+                <a:cs typeface="+mn-cs"/>
+              </a:defRPr>
+            </a:lvl8pPr>
+            <a:lvl9pPr marL="3657600" algn="l" defTabSz="914400" rtl="0" eaLnBrk="1" latinLnBrk="0" hangingPunct="1">
+              <a:defRPr sz="1800" kern="1200">
+                <a:solidFill>
+                  <a:schemeClr val="tx1"/>
+                </a:solidFill>
+                <a:latin typeface="+mn-lt"/>
+                <a:ea typeface="+mn-ea"/>
+                <a:cs typeface="+mn-cs"/>
+              </a:defRPr>
+            </a:lvl9pPr>
+          </a:lstStyle>
+          <a:p>
+            <a:r>
+              <a:rPr lang="zh-CN" altLang="en-US" dirty="0" smtClean="0"/>
+              <a:t>全连接</a:t>
+            </a:r>
+            <a:endParaRPr lang="zh-CN" altLang="en-US" dirty="0"/>
+          </a:p>
+        </p:txBody>
+      </p:sp>
+      <p:sp>
+        <p:nvSpPr>
+          <p:cNvPr id="21" name="文本框 20"/>
+          <p:cNvSpPr txBox="1"/>
+          <p:nvPr/>
+        </p:nvSpPr>
+        <p:spPr>
+          <a:xfrm>
+            <a:off x="6220929" y="1380041"/>
+            <a:ext cx="877163" cy="369332"/>
+          </a:xfrm>
+          <a:prstGeom prst="rect">
+            <a:avLst/>
+          </a:prstGeom>
+          <a:noFill/>
+        </p:spPr>
+        <p:txBody>
+          <a:bodyPr wrap="none" rtlCol="0">
+            <a:spAutoFit/>
+          </a:bodyPr>
+          <a:lstStyle>
+            <a:defPPr>
+              <a:defRPr lang="zh-CN"/>
+            </a:defPPr>
+            <a:lvl1pPr marL="0" algn="l" defTabSz="914400" rtl="0" eaLnBrk="1" latinLnBrk="0" hangingPunct="1">
+              <a:defRPr sz="1800" kern="1200">
+                <a:solidFill>
+                  <a:schemeClr val="tx1"/>
+                </a:solidFill>
+                <a:latin typeface="+mn-lt"/>
+                <a:ea typeface="+mn-ea"/>
+                <a:cs typeface="+mn-cs"/>
+              </a:defRPr>
+            </a:lvl1pPr>
+            <a:lvl2pPr marL="457200" algn="l" defTabSz="914400" rtl="0" eaLnBrk="1" latinLnBrk="0" hangingPunct="1">
+              <a:defRPr sz="1800" kern="1200">
+                <a:solidFill>
+                  <a:schemeClr val="tx1"/>
+                </a:solidFill>
+                <a:latin typeface="+mn-lt"/>
+                <a:ea typeface="+mn-ea"/>
+                <a:cs typeface="+mn-cs"/>
+              </a:defRPr>
+            </a:lvl2pPr>
+            <a:lvl3pPr marL="914400" algn="l" defTabSz="914400" rtl="0" eaLnBrk="1" latinLnBrk="0" hangingPunct="1">
+              <a:defRPr sz="1800" kern="1200">
+                <a:solidFill>
+                  <a:schemeClr val="tx1"/>
+                </a:solidFill>
+                <a:latin typeface="+mn-lt"/>
+                <a:ea typeface="+mn-ea"/>
+                <a:cs typeface="+mn-cs"/>
+              </a:defRPr>
+            </a:lvl3pPr>
+            <a:lvl4pPr marL="1371600" algn="l" defTabSz="914400" rtl="0" eaLnBrk="1" latinLnBrk="0" hangingPunct="1">
+              <a:defRPr sz="1800" kern="1200">
+                <a:solidFill>
+                  <a:schemeClr val="tx1"/>
+                </a:solidFill>
+                <a:latin typeface="+mn-lt"/>
+                <a:ea typeface="+mn-ea"/>
+                <a:cs typeface="+mn-cs"/>
+              </a:defRPr>
+            </a:lvl4pPr>
+            <a:lvl5pPr marL="1828800" algn="l" defTabSz="914400" rtl="0" eaLnBrk="1" latinLnBrk="0" hangingPunct="1">
+              <a:defRPr sz="1800" kern="1200">
+                <a:solidFill>
+                  <a:schemeClr val="tx1"/>
+                </a:solidFill>
+                <a:latin typeface="+mn-lt"/>
+                <a:ea typeface="+mn-ea"/>
+                <a:cs typeface="+mn-cs"/>
+              </a:defRPr>
+            </a:lvl5pPr>
+            <a:lvl6pPr marL="2286000" algn="l" defTabSz="914400" rtl="0" eaLnBrk="1" latinLnBrk="0" hangingPunct="1">
+              <a:defRPr sz="1800" kern="1200">
+                <a:solidFill>
+                  <a:schemeClr val="tx1"/>
+                </a:solidFill>
+                <a:latin typeface="+mn-lt"/>
+                <a:ea typeface="+mn-ea"/>
+                <a:cs typeface="+mn-cs"/>
+              </a:defRPr>
+            </a:lvl6pPr>
+            <a:lvl7pPr marL="2743200" algn="l" defTabSz="914400" rtl="0" eaLnBrk="1" latinLnBrk="0" hangingPunct="1">
+              <a:defRPr sz="1800" kern="1200">
+                <a:solidFill>
+                  <a:schemeClr val="tx1"/>
+                </a:solidFill>
+                <a:latin typeface="+mn-lt"/>
+                <a:ea typeface="+mn-ea"/>
+                <a:cs typeface="+mn-cs"/>
+              </a:defRPr>
+            </a:lvl7pPr>
+            <a:lvl8pPr marL="3200400" algn="l" defTabSz="914400" rtl="0" eaLnBrk="1" latinLnBrk="0" hangingPunct="1">
+              <a:defRPr sz="1800" kern="1200">
+                <a:solidFill>
+                  <a:schemeClr val="tx1"/>
+                </a:solidFill>
+                <a:latin typeface="+mn-lt"/>
+                <a:ea typeface="+mn-ea"/>
+                <a:cs typeface="+mn-cs"/>
+              </a:defRPr>
+            </a:lvl8pPr>
+            <a:lvl9pPr marL="3657600" algn="l" defTabSz="914400" rtl="0" eaLnBrk="1" latinLnBrk="0" hangingPunct="1">
+              <a:defRPr sz="1800" kern="1200">
+                <a:solidFill>
+                  <a:schemeClr val="tx1"/>
+                </a:solidFill>
+                <a:latin typeface="+mn-lt"/>
+                <a:ea typeface="+mn-ea"/>
+                <a:cs typeface="+mn-cs"/>
+              </a:defRPr>
+            </a:lvl9pPr>
+          </a:lstStyle>
+          <a:p>
+            <a:r>
+              <a:rPr lang="zh-CN" altLang="en-US" dirty="0" smtClean="0"/>
+              <a:t>全连接</a:t>
+            </a:r>
+            <a:endParaRPr lang="zh-CN" altLang="en-US" dirty="0"/>
+          </a:p>
+        </p:txBody>
+      </p:sp>
+      <p:sp>
+        <p:nvSpPr>
+          <p:cNvPr id="40" name="圆角矩形 39"/>
+          <p:cNvSpPr/>
+          <p:nvPr/>
+        </p:nvSpPr>
+        <p:spPr>
+          <a:xfrm>
+            <a:off x="2463110" y="2887114"/>
+            <a:ext cx="278728" cy="1694327"/>
+          </a:xfrm>
+          <a:prstGeom prst="roundRect">
+            <a:avLst/>
+          </a:prstGeom>
+        </p:spPr>
+        <p:style>
+          <a:lnRef idx="2">
+            <a:schemeClr val="accent1">
+              <a:shade val="50000"/>
+            </a:schemeClr>
+          </a:lnRef>
+          <a:fillRef idx="1">
+            <a:schemeClr val="accent1"/>
+          </a:fillRef>
+          <a:effectRef idx="0">
+            <a:schemeClr val="accent1"/>
+          </a:effectRef>
+          <a:fontRef idx="minor">
+            <a:schemeClr val="lt1"/>
+          </a:fontRef>
+        </p:style>
+        <p:txBody>
+          <a:bodyPr rtlCol="0" anchor="ctr"/>
+          <a:lstStyle>
+            <a:defPPr>
+              <a:defRPr lang="zh-CN"/>
+            </a:defPPr>
+            <a:lvl1pPr marL="0" algn="l" defTabSz="914400" rtl="0" eaLnBrk="1" latinLnBrk="0" hangingPunct="1">
+              <a:defRPr sz="1800" kern="1200">
+                <a:solidFill>
+                  <a:schemeClr val="lt1"/>
+                </a:solidFill>
+                <a:latin typeface="+mn-lt"/>
+                <a:ea typeface="+mn-ea"/>
+                <a:cs typeface="+mn-cs"/>
+              </a:defRPr>
+            </a:lvl1pPr>
+            <a:lvl2pPr marL="457200" algn="l" defTabSz="914400" rtl="0" eaLnBrk="1" latinLnBrk="0" hangingPunct="1">
+              <a:defRPr sz="1800" kern="1200">
+                <a:solidFill>
+                  <a:schemeClr val="lt1"/>
+                </a:solidFill>
+                <a:latin typeface="+mn-lt"/>
+                <a:ea typeface="+mn-ea"/>
+                <a:cs typeface="+mn-cs"/>
+              </a:defRPr>
+            </a:lvl2pPr>
+            <a:lvl3pPr marL="914400" algn="l" defTabSz="914400" rtl="0" eaLnBrk="1" latinLnBrk="0" hangingPunct="1">
+              <a:defRPr sz="1800" kern="1200">
+                <a:solidFill>
+                  <a:schemeClr val="lt1"/>
+                </a:solidFill>
+                <a:latin typeface="+mn-lt"/>
+                <a:ea typeface="+mn-ea"/>
+                <a:cs typeface="+mn-cs"/>
+              </a:defRPr>
+            </a:lvl3pPr>
+            <a:lvl4pPr marL="1371600" algn="l" defTabSz="914400" rtl="0" eaLnBrk="1" latinLnBrk="0" hangingPunct="1">
+              <a:defRPr sz="1800" kern="1200">
+                <a:solidFill>
+                  <a:schemeClr val="lt1"/>
+                </a:solidFill>
+                <a:latin typeface="+mn-lt"/>
+                <a:ea typeface="+mn-ea"/>
+                <a:cs typeface="+mn-cs"/>
+              </a:defRPr>
+            </a:lvl4pPr>
+            <a:lvl5pPr marL="1828800" algn="l" defTabSz="914400" rtl="0" eaLnBrk="1" latinLnBrk="0" hangingPunct="1">
+              <a:defRPr sz="1800" kern="1200">
+                <a:solidFill>
+                  <a:schemeClr val="lt1"/>
+                </a:solidFill>
+                <a:latin typeface="+mn-lt"/>
+                <a:ea typeface="+mn-ea"/>
+                <a:cs typeface="+mn-cs"/>
+              </a:defRPr>
+            </a:lvl5pPr>
+            <a:lvl6pPr marL="2286000" algn="l" defTabSz="914400" rtl="0" eaLnBrk="1" latinLnBrk="0" hangingPunct="1">
+              <a:defRPr sz="1800" kern="1200">
+                <a:solidFill>
+                  <a:schemeClr val="lt1"/>
+                </a:solidFill>
+                <a:latin typeface="+mn-lt"/>
+                <a:ea typeface="+mn-ea"/>
+                <a:cs typeface="+mn-cs"/>
+              </a:defRPr>
+            </a:lvl6pPr>
+            <a:lvl7pPr marL="2743200" algn="l" defTabSz="914400" rtl="0" eaLnBrk="1" latinLnBrk="0" hangingPunct="1">
+              <a:defRPr sz="1800" kern="1200">
+                <a:solidFill>
+                  <a:schemeClr val="lt1"/>
+                </a:solidFill>
+                <a:latin typeface="+mn-lt"/>
+                <a:ea typeface="+mn-ea"/>
+                <a:cs typeface="+mn-cs"/>
+              </a:defRPr>
+            </a:lvl7pPr>
+            <a:lvl8pPr marL="3200400" algn="l" defTabSz="914400" rtl="0" eaLnBrk="1" latinLnBrk="0" hangingPunct="1">
+              <a:defRPr sz="1800" kern="1200">
+                <a:solidFill>
+                  <a:schemeClr val="lt1"/>
+                </a:solidFill>
+                <a:latin typeface="+mn-lt"/>
+                <a:ea typeface="+mn-ea"/>
+                <a:cs typeface="+mn-cs"/>
+              </a:defRPr>
+            </a:lvl8pPr>
+            <a:lvl9pPr marL="3657600" algn="l" defTabSz="914400" rtl="0" eaLnBrk="1" latinLnBrk="0" hangingPunct="1">
+              <a:defRPr sz="1800" kern="1200">
+                <a:solidFill>
+                  <a:schemeClr val="lt1"/>
+                </a:solidFill>
+                <a:latin typeface="+mn-lt"/>
+                <a:ea typeface="+mn-ea"/>
+                <a:cs typeface="+mn-cs"/>
+              </a:defRPr>
+            </a:lvl9pPr>
+          </a:lstStyle>
+          <a:p>
+            <a:pPr algn="ctr"/>
+            <a:endParaRPr lang="zh-CN" altLang="en-US"/>
+          </a:p>
+        </p:txBody>
+      </p:sp>
+      <p:sp>
+        <p:nvSpPr>
+          <p:cNvPr id="41" name="圆角矩形 40"/>
+          <p:cNvSpPr/>
+          <p:nvPr/>
+        </p:nvSpPr>
+        <p:spPr>
+          <a:xfrm>
+            <a:off x="4109724" y="2842259"/>
+            <a:ext cx="277216" cy="2178422"/>
+          </a:xfrm>
+          <a:prstGeom prst="roundRect">
+            <a:avLst/>
+          </a:prstGeom>
+        </p:spPr>
+        <p:style>
+          <a:lnRef idx="2">
+            <a:schemeClr val="accent1">
+              <a:shade val="50000"/>
+            </a:schemeClr>
+          </a:lnRef>
+          <a:fillRef idx="1">
+            <a:schemeClr val="accent1"/>
+          </a:fillRef>
+          <a:effectRef idx="0">
+            <a:schemeClr val="accent1"/>
+          </a:effectRef>
+          <a:fontRef idx="minor">
+            <a:schemeClr val="lt1"/>
+          </a:fontRef>
+        </p:style>
+        <p:txBody>
+          <a:bodyPr rtlCol="0" anchor="ctr"/>
+          <a:lstStyle>
+            <a:defPPr>
+              <a:defRPr lang="zh-CN"/>
+            </a:defPPr>
+            <a:lvl1pPr marL="0" algn="l" defTabSz="914400" rtl="0" eaLnBrk="1" latinLnBrk="0" hangingPunct="1">
+              <a:defRPr sz="1800" kern="1200">
+                <a:solidFill>
+                  <a:schemeClr val="lt1"/>
+                </a:solidFill>
+                <a:latin typeface="+mn-lt"/>
+                <a:ea typeface="+mn-ea"/>
+                <a:cs typeface="+mn-cs"/>
+              </a:defRPr>
+            </a:lvl1pPr>
+            <a:lvl2pPr marL="457200" algn="l" defTabSz="914400" rtl="0" eaLnBrk="1" latinLnBrk="0" hangingPunct="1">
+              <a:defRPr sz="1800" kern="1200">
+                <a:solidFill>
+                  <a:schemeClr val="lt1"/>
+                </a:solidFill>
+                <a:latin typeface="+mn-lt"/>
+                <a:ea typeface="+mn-ea"/>
+                <a:cs typeface="+mn-cs"/>
+              </a:defRPr>
+            </a:lvl2pPr>
+            <a:lvl3pPr marL="914400" algn="l" defTabSz="914400" rtl="0" eaLnBrk="1" latinLnBrk="0" hangingPunct="1">
+              <a:defRPr sz="1800" kern="1200">
+                <a:solidFill>
+                  <a:schemeClr val="lt1"/>
+                </a:solidFill>
+                <a:latin typeface="+mn-lt"/>
+                <a:ea typeface="+mn-ea"/>
+                <a:cs typeface="+mn-cs"/>
+              </a:defRPr>
+            </a:lvl3pPr>
+            <a:lvl4pPr marL="1371600" algn="l" defTabSz="914400" rtl="0" eaLnBrk="1" latinLnBrk="0" hangingPunct="1">
+              <a:defRPr sz="1800" kern="1200">
+                <a:solidFill>
+                  <a:schemeClr val="lt1"/>
+                </a:solidFill>
+                <a:latin typeface="+mn-lt"/>
+                <a:ea typeface="+mn-ea"/>
+                <a:cs typeface="+mn-cs"/>
+              </a:defRPr>
+            </a:lvl4pPr>
+            <a:lvl5pPr marL="1828800" algn="l" defTabSz="914400" rtl="0" eaLnBrk="1" latinLnBrk="0" hangingPunct="1">
+              <a:defRPr sz="1800" kern="1200">
+                <a:solidFill>
+                  <a:schemeClr val="lt1"/>
+                </a:solidFill>
+                <a:latin typeface="+mn-lt"/>
+                <a:ea typeface="+mn-ea"/>
+                <a:cs typeface="+mn-cs"/>
+              </a:defRPr>
+            </a:lvl5pPr>
+            <a:lvl6pPr marL="2286000" algn="l" defTabSz="914400" rtl="0" eaLnBrk="1" latinLnBrk="0" hangingPunct="1">
+              <a:defRPr sz="1800" kern="1200">
+                <a:solidFill>
+                  <a:schemeClr val="lt1"/>
+                </a:solidFill>
+                <a:latin typeface="+mn-lt"/>
+                <a:ea typeface="+mn-ea"/>
+                <a:cs typeface="+mn-cs"/>
+              </a:defRPr>
+            </a:lvl6pPr>
+            <a:lvl7pPr marL="2743200" algn="l" defTabSz="914400" rtl="0" eaLnBrk="1" latinLnBrk="0" hangingPunct="1">
+              <a:defRPr sz="1800" kern="1200">
+                <a:solidFill>
+                  <a:schemeClr val="lt1"/>
+                </a:solidFill>
+                <a:latin typeface="+mn-lt"/>
+                <a:ea typeface="+mn-ea"/>
+                <a:cs typeface="+mn-cs"/>
+              </a:defRPr>
+            </a:lvl7pPr>
+            <a:lvl8pPr marL="3200400" algn="l" defTabSz="914400" rtl="0" eaLnBrk="1" latinLnBrk="0" hangingPunct="1">
+              <a:defRPr sz="1800" kern="1200">
+                <a:solidFill>
+                  <a:schemeClr val="lt1"/>
+                </a:solidFill>
+                <a:latin typeface="+mn-lt"/>
+                <a:ea typeface="+mn-ea"/>
+                <a:cs typeface="+mn-cs"/>
+              </a:defRPr>
+            </a:lvl8pPr>
+            <a:lvl9pPr marL="3657600" algn="l" defTabSz="914400" rtl="0" eaLnBrk="1" latinLnBrk="0" hangingPunct="1">
+              <a:defRPr sz="1800" kern="1200">
+                <a:solidFill>
+                  <a:schemeClr val="lt1"/>
+                </a:solidFill>
+                <a:latin typeface="+mn-lt"/>
+                <a:ea typeface="+mn-ea"/>
+                <a:cs typeface="+mn-cs"/>
+              </a:defRPr>
+            </a:lvl9pPr>
+          </a:lstStyle>
+          <a:p>
+            <a:pPr algn="ctr"/>
+            <a:endParaRPr lang="zh-CN" altLang="en-US"/>
+          </a:p>
+        </p:txBody>
+      </p:sp>
+      <p:sp>
+        <p:nvSpPr>
+          <p:cNvPr id="42" name="圆角矩形 41"/>
+          <p:cNvSpPr/>
+          <p:nvPr/>
+        </p:nvSpPr>
+        <p:spPr>
+          <a:xfrm>
+            <a:off x="5738224" y="2842259"/>
+            <a:ext cx="261513" cy="2178422"/>
+          </a:xfrm>
+          <a:prstGeom prst="roundRect">
+            <a:avLst/>
+          </a:prstGeom>
+        </p:spPr>
+        <p:style>
+          <a:lnRef idx="2">
+            <a:schemeClr val="accent1">
+              <a:shade val="50000"/>
+            </a:schemeClr>
+          </a:lnRef>
+          <a:fillRef idx="1">
+            <a:schemeClr val="accent1"/>
+          </a:fillRef>
+          <a:effectRef idx="0">
+            <a:schemeClr val="accent1"/>
+          </a:effectRef>
+          <a:fontRef idx="minor">
+            <a:schemeClr val="lt1"/>
+          </a:fontRef>
+        </p:style>
+        <p:txBody>
+          <a:bodyPr rtlCol="0" anchor="ctr"/>
+          <a:lstStyle>
+            <a:defPPr>
+              <a:defRPr lang="zh-CN"/>
+            </a:defPPr>
+            <a:lvl1pPr marL="0" algn="l" defTabSz="914400" rtl="0" eaLnBrk="1" latinLnBrk="0" hangingPunct="1">
+              <a:defRPr sz="1800" kern="1200">
+                <a:solidFill>
+                  <a:schemeClr val="lt1"/>
+                </a:solidFill>
+                <a:latin typeface="+mn-lt"/>
+                <a:ea typeface="+mn-ea"/>
+                <a:cs typeface="+mn-cs"/>
+              </a:defRPr>
+            </a:lvl1pPr>
+            <a:lvl2pPr marL="457200" algn="l" defTabSz="914400" rtl="0" eaLnBrk="1" latinLnBrk="0" hangingPunct="1">
+              <a:defRPr sz="1800" kern="1200">
+                <a:solidFill>
+                  <a:schemeClr val="lt1"/>
+                </a:solidFill>
+                <a:latin typeface="+mn-lt"/>
+                <a:ea typeface="+mn-ea"/>
+                <a:cs typeface="+mn-cs"/>
+              </a:defRPr>
+            </a:lvl2pPr>
+            <a:lvl3pPr marL="914400" algn="l" defTabSz="914400" rtl="0" eaLnBrk="1" latinLnBrk="0" hangingPunct="1">
+              <a:defRPr sz="1800" kern="1200">
+                <a:solidFill>
+                  <a:schemeClr val="lt1"/>
+                </a:solidFill>
+                <a:latin typeface="+mn-lt"/>
+                <a:ea typeface="+mn-ea"/>
+                <a:cs typeface="+mn-cs"/>
+              </a:defRPr>
+            </a:lvl3pPr>
+            <a:lvl4pPr marL="1371600" algn="l" defTabSz="914400" rtl="0" eaLnBrk="1" latinLnBrk="0" hangingPunct="1">
+              <a:defRPr sz="1800" kern="1200">
+                <a:solidFill>
+                  <a:schemeClr val="lt1"/>
+                </a:solidFill>
+                <a:latin typeface="+mn-lt"/>
+                <a:ea typeface="+mn-ea"/>
+                <a:cs typeface="+mn-cs"/>
+              </a:defRPr>
+            </a:lvl4pPr>
+            <a:lvl5pPr marL="1828800" algn="l" defTabSz="914400" rtl="0" eaLnBrk="1" latinLnBrk="0" hangingPunct="1">
+              <a:defRPr sz="1800" kern="1200">
+                <a:solidFill>
+                  <a:schemeClr val="lt1"/>
+                </a:solidFill>
+                <a:latin typeface="+mn-lt"/>
+                <a:ea typeface="+mn-ea"/>
+                <a:cs typeface="+mn-cs"/>
+              </a:defRPr>
+            </a:lvl5pPr>
+            <a:lvl6pPr marL="2286000" algn="l" defTabSz="914400" rtl="0" eaLnBrk="1" latinLnBrk="0" hangingPunct="1">
+              <a:defRPr sz="1800" kern="1200">
+                <a:solidFill>
+                  <a:schemeClr val="lt1"/>
+                </a:solidFill>
+                <a:latin typeface="+mn-lt"/>
+                <a:ea typeface="+mn-ea"/>
+                <a:cs typeface="+mn-cs"/>
+              </a:defRPr>
+            </a:lvl6pPr>
+            <a:lvl7pPr marL="2743200" algn="l" defTabSz="914400" rtl="0" eaLnBrk="1" latinLnBrk="0" hangingPunct="1">
+              <a:defRPr sz="1800" kern="1200">
+                <a:solidFill>
+                  <a:schemeClr val="lt1"/>
+                </a:solidFill>
+                <a:latin typeface="+mn-lt"/>
+                <a:ea typeface="+mn-ea"/>
+                <a:cs typeface="+mn-cs"/>
+              </a:defRPr>
+            </a:lvl7pPr>
+            <a:lvl8pPr marL="3200400" algn="l" defTabSz="914400" rtl="0" eaLnBrk="1" latinLnBrk="0" hangingPunct="1">
+              <a:defRPr sz="1800" kern="1200">
+                <a:solidFill>
+                  <a:schemeClr val="lt1"/>
+                </a:solidFill>
+                <a:latin typeface="+mn-lt"/>
+                <a:ea typeface="+mn-ea"/>
+                <a:cs typeface="+mn-cs"/>
+              </a:defRPr>
+            </a:lvl8pPr>
+            <a:lvl9pPr marL="3657600" algn="l" defTabSz="914400" rtl="0" eaLnBrk="1" latinLnBrk="0" hangingPunct="1">
+              <a:defRPr sz="1800" kern="1200">
+                <a:solidFill>
+                  <a:schemeClr val="lt1"/>
+                </a:solidFill>
+                <a:latin typeface="+mn-lt"/>
+                <a:ea typeface="+mn-ea"/>
+                <a:cs typeface="+mn-cs"/>
+              </a:defRPr>
+            </a:lvl9pPr>
+          </a:lstStyle>
+          <a:p>
+            <a:pPr algn="ctr"/>
+            <a:endParaRPr lang="zh-CN" altLang="en-US"/>
+          </a:p>
+        </p:txBody>
+      </p:sp>
+      <p:sp>
+        <p:nvSpPr>
+          <p:cNvPr id="43" name="文本框 42"/>
+          <p:cNvSpPr txBox="1"/>
+          <p:nvPr/>
+        </p:nvSpPr>
+        <p:spPr>
+          <a:xfrm>
+            <a:off x="1897724" y="1732924"/>
+            <a:ext cx="535724" cy="369332"/>
+          </a:xfrm>
+          <a:prstGeom prst="rect">
+            <a:avLst/>
+          </a:prstGeom>
+          <a:noFill/>
+        </p:spPr>
+        <p:txBody>
+          <a:bodyPr wrap="none" rtlCol="0">
+            <a:spAutoFit/>
+          </a:bodyPr>
+          <a:lstStyle/>
+          <a:p>
+            <a:r>
+              <a:rPr lang="en-US" altLang="zh-CN" dirty="0" smtClean="0"/>
+              <a:t>392</a:t>
+            </a:r>
+            <a:endParaRPr lang="zh-CN" altLang="en-US" dirty="0"/>
+          </a:p>
+        </p:txBody>
+      </p:sp>
+      <p:sp>
+        <p:nvSpPr>
+          <p:cNvPr id="44" name="文本框 43"/>
+          <p:cNvSpPr txBox="1"/>
+          <p:nvPr/>
+        </p:nvSpPr>
+        <p:spPr>
+          <a:xfrm>
+            <a:off x="1897724" y="3528981"/>
+            <a:ext cx="535724" cy="369332"/>
+          </a:xfrm>
+          <a:prstGeom prst="rect">
+            <a:avLst/>
+          </a:prstGeom>
+          <a:noFill/>
+        </p:spPr>
+        <p:txBody>
+          <a:bodyPr wrap="none" rtlCol="0">
+            <a:spAutoFit/>
+          </a:bodyPr>
+          <a:lstStyle/>
+          <a:p>
+            <a:r>
+              <a:rPr lang="en-US" altLang="zh-CN" dirty="0" smtClean="0"/>
+              <a:t>392</a:t>
+            </a:r>
+            <a:endParaRPr lang="zh-CN" altLang="en-US" dirty="0"/>
+          </a:p>
+        </p:txBody>
+      </p:sp>
+      <p:sp>
+        <p:nvSpPr>
+          <p:cNvPr id="45" name="文本框 44"/>
+          <p:cNvSpPr txBox="1"/>
+          <p:nvPr/>
+        </p:nvSpPr>
+        <p:spPr>
+          <a:xfrm>
+            <a:off x="3620264" y="1077104"/>
+            <a:ext cx="535724" cy="369332"/>
+          </a:xfrm>
+          <a:prstGeom prst="rect">
+            <a:avLst/>
+          </a:prstGeom>
+          <a:noFill/>
+        </p:spPr>
+        <p:txBody>
+          <a:bodyPr wrap="none" rtlCol="0">
+            <a:spAutoFit/>
+          </a:bodyPr>
+          <a:lstStyle>
+            <a:defPPr>
+              <a:defRPr lang="zh-CN"/>
+            </a:defPPr>
+            <a:lvl1pPr marL="0" algn="l" defTabSz="914400" rtl="0" eaLnBrk="1" latinLnBrk="0" hangingPunct="1">
+              <a:defRPr sz="1800" kern="1200">
+                <a:solidFill>
+                  <a:schemeClr val="tx1"/>
+                </a:solidFill>
+                <a:latin typeface="+mn-lt"/>
+                <a:ea typeface="+mn-ea"/>
+                <a:cs typeface="+mn-cs"/>
+              </a:defRPr>
+            </a:lvl1pPr>
+            <a:lvl2pPr marL="457200" algn="l" defTabSz="914400" rtl="0" eaLnBrk="1" latinLnBrk="0" hangingPunct="1">
+              <a:defRPr sz="1800" kern="1200">
+                <a:solidFill>
+                  <a:schemeClr val="tx1"/>
+                </a:solidFill>
+                <a:latin typeface="+mn-lt"/>
+                <a:ea typeface="+mn-ea"/>
+                <a:cs typeface="+mn-cs"/>
+              </a:defRPr>
+            </a:lvl2pPr>
+            <a:lvl3pPr marL="914400" algn="l" defTabSz="914400" rtl="0" eaLnBrk="1" latinLnBrk="0" hangingPunct="1">
+              <a:defRPr sz="1800" kern="1200">
+                <a:solidFill>
+                  <a:schemeClr val="tx1"/>
+                </a:solidFill>
+                <a:latin typeface="+mn-lt"/>
+                <a:ea typeface="+mn-ea"/>
+                <a:cs typeface="+mn-cs"/>
+              </a:defRPr>
+            </a:lvl3pPr>
+            <a:lvl4pPr marL="1371600" algn="l" defTabSz="914400" rtl="0" eaLnBrk="1" latinLnBrk="0" hangingPunct="1">
+              <a:defRPr sz="1800" kern="1200">
+                <a:solidFill>
+                  <a:schemeClr val="tx1"/>
+                </a:solidFill>
+                <a:latin typeface="+mn-lt"/>
+                <a:ea typeface="+mn-ea"/>
+                <a:cs typeface="+mn-cs"/>
+              </a:defRPr>
+            </a:lvl4pPr>
+            <a:lvl5pPr marL="1828800" algn="l" defTabSz="914400" rtl="0" eaLnBrk="1" latinLnBrk="0" hangingPunct="1">
+              <a:defRPr sz="1800" kern="1200">
+                <a:solidFill>
+                  <a:schemeClr val="tx1"/>
+                </a:solidFill>
+                <a:latin typeface="+mn-lt"/>
+                <a:ea typeface="+mn-ea"/>
+                <a:cs typeface="+mn-cs"/>
+              </a:defRPr>
+            </a:lvl5pPr>
+            <a:lvl6pPr marL="2286000" algn="l" defTabSz="914400" rtl="0" eaLnBrk="1" latinLnBrk="0" hangingPunct="1">
+              <a:defRPr sz="1800" kern="1200">
+                <a:solidFill>
+                  <a:schemeClr val="tx1"/>
+                </a:solidFill>
+                <a:latin typeface="+mn-lt"/>
+                <a:ea typeface="+mn-ea"/>
+                <a:cs typeface="+mn-cs"/>
+              </a:defRPr>
+            </a:lvl6pPr>
+            <a:lvl7pPr marL="2743200" algn="l" defTabSz="914400" rtl="0" eaLnBrk="1" latinLnBrk="0" hangingPunct="1">
+              <a:defRPr sz="1800" kern="1200">
+                <a:solidFill>
+                  <a:schemeClr val="tx1"/>
+                </a:solidFill>
+                <a:latin typeface="+mn-lt"/>
+                <a:ea typeface="+mn-ea"/>
+                <a:cs typeface="+mn-cs"/>
+              </a:defRPr>
+            </a:lvl7pPr>
+            <a:lvl8pPr marL="3200400" algn="l" defTabSz="914400" rtl="0" eaLnBrk="1" latinLnBrk="0" hangingPunct="1">
+              <a:defRPr sz="1800" kern="1200">
+                <a:solidFill>
+                  <a:schemeClr val="tx1"/>
+                </a:solidFill>
+                <a:latin typeface="+mn-lt"/>
+                <a:ea typeface="+mn-ea"/>
+                <a:cs typeface="+mn-cs"/>
+              </a:defRPr>
+            </a:lvl8pPr>
+            <a:lvl9pPr marL="3657600" algn="l" defTabSz="914400" rtl="0" eaLnBrk="1" latinLnBrk="0" hangingPunct="1">
+              <a:defRPr sz="1800" kern="1200">
+                <a:solidFill>
+                  <a:schemeClr val="tx1"/>
+                </a:solidFill>
+                <a:latin typeface="+mn-lt"/>
+                <a:ea typeface="+mn-ea"/>
+                <a:cs typeface="+mn-cs"/>
+              </a:defRPr>
+            </a:lvl9pPr>
+          </a:lstStyle>
+          <a:p>
+            <a:r>
+              <a:rPr lang="en-US" altLang="zh-CN" dirty="0" smtClean="0"/>
+              <a:t>512</a:t>
+            </a:r>
+            <a:endParaRPr lang="zh-CN" altLang="en-US" dirty="0"/>
+          </a:p>
+        </p:txBody>
+      </p:sp>
+      <p:sp>
+        <p:nvSpPr>
+          <p:cNvPr id="46" name="文本框 45"/>
+          <p:cNvSpPr txBox="1"/>
+          <p:nvPr/>
+        </p:nvSpPr>
+        <p:spPr>
+          <a:xfrm>
+            <a:off x="5206395" y="1077104"/>
+            <a:ext cx="535724" cy="369332"/>
+          </a:xfrm>
+          <a:prstGeom prst="rect">
+            <a:avLst/>
+          </a:prstGeom>
+          <a:noFill/>
+        </p:spPr>
+        <p:txBody>
+          <a:bodyPr wrap="none" rtlCol="0">
+            <a:spAutoFit/>
+          </a:bodyPr>
+          <a:lstStyle>
+            <a:defPPr>
+              <a:defRPr lang="zh-CN"/>
+            </a:defPPr>
+            <a:lvl1pPr marL="0" algn="l" defTabSz="914400" rtl="0" eaLnBrk="1" latinLnBrk="0" hangingPunct="1">
+              <a:defRPr sz="1800" kern="1200">
+                <a:solidFill>
+                  <a:schemeClr val="tx1"/>
+                </a:solidFill>
+                <a:latin typeface="+mn-lt"/>
+                <a:ea typeface="+mn-ea"/>
+                <a:cs typeface="+mn-cs"/>
+              </a:defRPr>
+            </a:lvl1pPr>
+            <a:lvl2pPr marL="457200" algn="l" defTabSz="914400" rtl="0" eaLnBrk="1" latinLnBrk="0" hangingPunct="1">
+              <a:defRPr sz="1800" kern="1200">
+                <a:solidFill>
+                  <a:schemeClr val="tx1"/>
+                </a:solidFill>
+                <a:latin typeface="+mn-lt"/>
+                <a:ea typeface="+mn-ea"/>
+                <a:cs typeface="+mn-cs"/>
+              </a:defRPr>
+            </a:lvl2pPr>
+            <a:lvl3pPr marL="914400" algn="l" defTabSz="914400" rtl="0" eaLnBrk="1" latinLnBrk="0" hangingPunct="1">
+              <a:defRPr sz="1800" kern="1200">
+                <a:solidFill>
+                  <a:schemeClr val="tx1"/>
+                </a:solidFill>
+                <a:latin typeface="+mn-lt"/>
+                <a:ea typeface="+mn-ea"/>
+                <a:cs typeface="+mn-cs"/>
+              </a:defRPr>
+            </a:lvl3pPr>
+            <a:lvl4pPr marL="1371600" algn="l" defTabSz="914400" rtl="0" eaLnBrk="1" latinLnBrk="0" hangingPunct="1">
+              <a:defRPr sz="1800" kern="1200">
+                <a:solidFill>
+                  <a:schemeClr val="tx1"/>
+                </a:solidFill>
+                <a:latin typeface="+mn-lt"/>
+                <a:ea typeface="+mn-ea"/>
+                <a:cs typeface="+mn-cs"/>
+              </a:defRPr>
+            </a:lvl4pPr>
+            <a:lvl5pPr marL="1828800" algn="l" defTabSz="914400" rtl="0" eaLnBrk="1" latinLnBrk="0" hangingPunct="1">
+              <a:defRPr sz="1800" kern="1200">
+                <a:solidFill>
+                  <a:schemeClr val="tx1"/>
+                </a:solidFill>
+                <a:latin typeface="+mn-lt"/>
+                <a:ea typeface="+mn-ea"/>
+                <a:cs typeface="+mn-cs"/>
+              </a:defRPr>
+            </a:lvl5pPr>
+            <a:lvl6pPr marL="2286000" algn="l" defTabSz="914400" rtl="0" eaLnBrk="1" latinLnBrk="0" hangingPunct="1">
+              <a:defRPr sz="1800" kern="1200">
+                <a:solidFill>
+                  <a:schemeClr val="tx1"/>
+                </a:solidFill>
+                <a:latin typeface="+mn-lt"/>
+                <a:ea typeface="+mn-ea"/>
+                <a:cs typeface="+mn-cs"/>
+              </a:defRPr>
+            </a:lvl6pPr>
+            <a:lvl7pPr marL="2743200" algn="l" defTabSz="914400" rtl="0" eaLnBrk="1" latinLnBrk="0" hangingPunct="1">
+              <a:defRPr sz="1800" kern="1200">
+                <a:solidFill>
+                  <a:schemeClr val="tx1"/>
+                </a:solidFill>
+                <a:latin typeface="+mn-lt"/>
+                <a:ea typeface="+mn-ea"/>
+                <a:cs typeface="+mn-cs"/>
+              </a:defRPr>
+            </a:lvl7pPr>
+            <a:lvl8pPr marL="3200400" algn="l" defTabSz="914400" rtl="0" eaLnBrk="1" latinLnBrk="0" hangingPunct="1">
+              <a:defRPr sz="1800" kern="1200">
+                <a:solidFill>
+                  <a:schemeClr val="tx1"/>
+                </a:solidFill>
+                <a:latin typeface="+mn-lt"/>
+                <a:ea typeface="+mn-ea"/>
+                <a:cs typeface="+mn-cs"/>
+              </a:defRPr>
+            </a:lvl8pPr>
+            <a:lvl9pPr marL="3657600" algn="l" defTabSz="914400" rtl="0" eaLnBrk="1" latinLnBrk="0" hangingPunct="1">
+              <a:defRPr sz="1800" kern="1200">
+                <a:solidFill>
+                  <a:schemeClr val="tx1"/>
+                </a:solidFill>
+                <a:latin typeface="+mn-lt"/>
+                <a:ea typeface="+mn-ea"/>
+                <a:cs typeface="+mn-cs"/>
+              </a:defRPr>
+            </a:lvl9pPr>
+          </a:lstStyle>
+          <a:p>
+            <a:r>
+              <a:rPr lang="en-US" altLang="zh-CN" dirty="0" smtClean="0"/>
+              <a:t>512</a:t>
+            </a:r>
+            <a:endParaRPr lang="zh-CN" altLang="en-US" dirty="0"/>
+          </a:p>
+        </p:txBody>
+      </p:sp>
+      <p:sp>
+        <p:nvSpPr>
+          <p:cNvPr id="47" name="文本框 46"/>
+          <p:cNvSpPr txBox="1"/>
+          <p:nvPr/>
+        </p:nvSpPr>
+        <p:spPr>
+          <a:xfrm>
+            <a:off x="5219102" y="4212109"/>
+            <a:ext cx="535724" cy="369332"/>
+          </a:xfrm>
+          <a:prstGeom prst="rect">
+            <a:avLst/>
+          </a:prstGeom>
+          <a:noFill/>
+        </p:spPr>
+        <p:txBody>
+          <a:bodyPr wrap="none" rtlCol="0">
+            <a:spAutoFit/>
+          </a:bodyPr>
+          <a:lstStyle>
+            <a:defPPr>
+              <a:defRPr lang="zh-CN"/>
+            </a:defPPr>
+            <a:lvl1pPr marL="0" algn="l" defTabSz="914400" rtl="0" eaLnBrk="1" latinLnBrk="0" hangingPunct="1">
+              <a:defRPr sz="1800" kern="1200">
+                <a:solidFill>
+                  <a:schemeClr val="tx1"/>
+                </a:solidFill>
+                <a:latin typeface="+mn-lt"/>
+                <a:ea typeface="+mn-ea"/>
+                <a:cs typeface="+mn-cs"/>
+              </a:defRPr>
+            </a:lvl1pPr>
+            <a:lvl2pPr marL="457200" algn="l" defTabSz="914400" rtl="0" eaLnBrk="1" latinLnBrk="0" hangingPunct="1">
+              <a:defRPr sz="1800" kern="1200">
+                <a:solidFill>
+                  <a:schemeClr val="tx1"/>
+                </a:solidFill>
+                <a:latin typeface="+mn-lt"/>
+                <a:ea typeface="+mn-ea"/>
+                <a:cs typeface="+mn-cs"/>
+              </a:defRPr>
+            </a:lvl2pPr>
+            <a:lvl3pPr marL="914400" algn="l" defTabSz="914400" rtl="0" eaLnBrk="1" latinLnBrk="0" hangingPunct="1">
+              <a:defRPr sz="1800" kern="1200">
+                <a:solidFill>
+                  <a:schemeClr val="tx1"/>
+                </a:solidFill>
+                <a:latin typeface="+mn-lt"/>
+                <a:ea typeface="+mn-ea"/>
+                <a:cs typeface="+mn-cs"/>
+              </a:defRPr>
+            </a:lvl3pPr>
+            <a:lvl4pPr marL="1371600" algn="l" defTabSz="914400" rtl="0" eaLnBrk="1" latinLnBrk="0" hangingPunct="1">
+              <a:defRPr sz="1800" kern="1200">
+                <a:solidFill>
+                  <a:schemeClr val="tx1"/>
+                </a:solidFill>
+                <a:latin typeface="+mn-lt"/>
+                <a:ea typeface="+mn-ea"/>
+                <a:cs typeface="+mn-cs"/>
+              </a:defRPr>
+            </a:lvl4pPr>
+            <a:lvl5pPr marL="1828800" algn="l" defTabSz="914400" rtl="0" eaLnBrk="1" latinLnBrk="0" hangingPunct="1">
+              <a:defRPr sz="1800" kern="1200">
+                <a:solidFill>
+                  <a:schemeClr val="tx1"/>
+                </a:solidFill>
+                <a:latin typeface="+mn-lt"/>
+                <a:ea typeface="+mn-ea"/>
+                <a:cs typeface="+mn-cs"/>
+              </a:defRPr>
+            </a:lvl5pPr>
+            <a:lvl6pPr marL="2286000" algn="l" defTabSz="914400" rtl="0" eaLnBrk="1" latinLnBrk="0" hangingPunct="1">
+              <a:defRPr sz="1800" kern="1200">
+                <a:solidFill>
+                  <a:schemeClr val="tx1"/>
+                </a:solidFill>
+                <a:latin typeface="+mn-lt"/>
+                <a:ea typeface="+mn-ea"/>
+                <a:cs typeface="+mn-cs"/>
+              </a:defRPr>
+            </a:lvl6pPr>
+            <a:lvl7pPr marL="2743200" algn="l" defTabSz="914400" rtl="0" eaLnBrk="1" latinLnBrk="0" hangingPunct="1">
+              <a:defRPr sz="1800" kern="1200">
+                <a:solidFill>
+                  <a:schemeClr val="tx1"/>
+                </a:solidFill>
+                <a:latin typeface="+mn-lt"/>
+                <a:ea typeface="+mn-ea"/>
+                <a:cs typeface="+mn-cs"/>
+              </a:defRPr>
+            </a:lvl7pPr>
+            <a:lvl8pPr marL="3200400" algn="l" defTabSz="914400" rtl="0" eaLnBrk="1" latinLnBrk="0" hangingPunct="1">
+              <a:defRPr sz="1800" kern="1200">
+                <a:solidFill>
+                  <a:schemeClr val="tx1"/>
+                </a:solidFill>
+                <a:latin typeface="+mn-lt"/>
+                <a:ea typeface="+mn-ea"/>
+                <a:cs typeface="+mn-cs"/>
+              </a:defRPr>
+            </a:lvl8pPr>
+            <a:lvl9pPr marL="3657600" algn="l" defTabSz="914400" rtl="0" eaLnBrk="1" latinLnBrk="0" hangingPunct="1">
+              <a:defRPr sz="1800" kern="1200">
+                <a:solidFill>
+                  <a:schemeClr val="tx1"/>
+                </a:solidFill>
+                <a:latin typeface="+mn-lt"/>
+                <a:ea typeface="+mn-ea"/>
+                <a:cs typeface="+mn-cs"/>
+              </a:defRPr>
+            </a:lvl9pPr>
+          </a:lstStyle>
+          <a:p>
+            <a:r>
+              <a:rPr lang="en-US" altLang="zh-CN" dirty="0" smtClean="0"/>
+              <a:t>512</a:t>
+            </a:r>
+            <a:endParaRPr lang="zh-CN" altLang="en-US" dirty="0"/>
+          </a:p>
+        </p:txBody>
+      </p:sp>
+      <p:sp>
+        <p:nvSpPr>
+          <p:cNvPr id="48" name="右箭头 47"/>
+          <p:cNvSpPr/>
+          <p:nvPr/>
+        </p:nvSpPr>
+        <p:spPr>
+          <a:xfrm rot="3953052">
+            <a:off x="2433922" y="2683640"/>
+            <a:ext cx="2097428" cy="212403"/>
+          </a:xfrm>
+          <a:prstGeom prst="rightArrow">
+            <a:avLst/>
+          </a:prstGeom>
+        </p:spPr>
+        <p:style>
+          <a:lnRef idx="2">
+            <a:schemeClr val="accent1">
+              <a:shade val="50000"/>
+            </a:schemeClr>
+          </a:lnRef>
+          <a:fillRef idx="1">
+            <a:schemeClr val="accent1"/>
+          </a:fillRef>
+          <a:effectRef idx="0">
+            <a:schemeClr val="accent1"/>
+          </a:effectRef>
+          <a:fontRef idx="minor">
+            <a:schemeClr val="lt1"/>
+          </a:fontRef>
+        </p:style>
+        <p:txBody>
+          <a:bodyPr rtlCol="0" anchor="ctr"/>
+          <a:lstStyle>
+            <a:defPPr>
+              <a:defRPr lang="zh-CN"/>
+            </a:defPPr>
+            <a:lvl1pPr marL="0" algn="l" defTabSz="914400" rtl="0" eaLnBrk="1" latinLnBrk="0" hangingPunct="1">
+              <a:defRPr sz="1800" kern="1200">
+                <a:solidFill>
+                  <a:schemeClr val="lt1"/>
+                </a:solidFill>
+                <a:latin typeface="+mn-lt"/>
+                <a:ea typeface="+mn-ea"/>
+                <a:cs typeface="+mn-cs"/>
+              </a:defRPr>
+            </a:lvl1pPr>
+            <a:lvl2pPr marL="457200" algn="l" defTabSz="914400" rtl="0" eaLnBrk="1" latinLnBrk="0" hangingPunct="1">
+              <a:defRPr sz="1800" kern="1200">
+                <a:solidFill>
+                  <a:schemeClr val="lt1"/>
+                </a:solidFill>
+                <a:latin typeface="+mn-lt"/>
+                <a:ea typeface="+mn-ea"/>
+                <a:cs typeface="+mn-cs"/>
+              </a:defRPr>
+            </a:lvl2pPr>
+            <a:lvl3pPr marL="914400" algn="l" defTabSz="914400" rtl="0" eaLnBrk="1" latinLnBrk="0" hangingPunct="1">
+              <a:defRPr sz="1800" kern="1200">
+                <a:solidFill>
+                  <a:schemeClr val="lt1"/>
+                </a:solidFill>
+                <a:latin typeface="+mn-lt"/>
+                <a:ea typeface="+mn-ea"/>
+                <a:cs typeface="+mn-cs"/>
+              </a:defRPr>
+            </a:lvl3pPr>
+            <a:lvl4pPr marL="1371600" algn="l" defTabSz="914400" rtl="0" eaLnBrk="1" latinLnBrk="0" hangingPunct="1">
+              <a:defRPr sz="1800" kern="1200">
+                <a:solidFill>
+                  <a:schemeClr val="lt1"/>
+                </a:solidFill>
+                <a:latin typeface="+mn-lt"/>
+                <a:ea typeface="+mn-ea"/>
+                <a:cs typeface="+mn-cs"/>
+              </a:defRPr>
+            </a:lvl4pPr>
+            <a:lvl5pPr marL="1828800" algn="l" defTabSz="914400" rtl="0" eaLnBrk="1" latinLnBrk="0" hangingPunct="1">
+              <a:defRPr sz="1800" kern="1200">
+                <a:solidFill>
+                  <a:schemeClr val="lt1"/>
+                </a:solidFill>
+                <a:latin typeface="+mn-lt"/>
+                <a:ea typeface="+mn-ea"/>
+                <a:cs typeface="+mn-cs"/>
+              </a:defRPr>
+            </a:lvl5pPr>
+            <a:lvl6pPr marL="2286000" algn="l" defTabSz="914400" rtl="0" eaLnBrk="1" latinLnBrk="0" hangingPunct="1">
+              <a:defRPr sz="1800" kern="1200">
+                <a:solidFill>
+                  <a:schemeClr val="lt1"/>
+                </a:solidFill>
+                <a:latin typeface="+mn-lt"/>
+                <a:ea typeface="+mn-ea"/>
+                <a:cs typeface="+mn-cs"/>
+              </a:defRPr>
+            </a:lvl6pPr>
+            <a:lvl7pPr marL="2743200" algn="l" defTabSz="914400" rtl="0" eaLnBrk="1" latinLnBrk="0" hangingPunct="1">
+              <a:defRPr sz="1800" kern="1200">
+                <a:solidFill>
+                  <a:schemeClr val="lt1"/>
+                </a:solidFill>
+                <a:latin typeface="+mn-lt"/>
+                <a:ea typeface="+mn-ea"/>
+                <a:cs typeface="+mn-cs"/>
+              </a:defRPr>
+            </a:lvl7pPr>
+            <a:lvl8pPr marL="3200400" algn="l" defTabSz="914400" rtl="0" eaLnBrk="1" latinLnBrk="0" hangingPunct="1">
+              <a:defRPr sz="1800" kern="1200">
+                <a:solidFill>
+                  <a:schemeClr val="lt1"/>
+                </a:solidFill>
+                <a:latin typeface="+mn-lt"/>
+                <a:ea typeface="+mn-ea"/>
+                <a:cs typeface="+mn-cs"/>
+              </a:defRPr>
+            </a:lvl8pPr>
+            <a:lvl9pPr marL="3657600" algn="l" defTabSz="914400" rtl="0" eaLnBrk="1" latinLnBrk="0" hangingPunct="1">
+              <a:defRPr sz="1800" kern="1200">
+                <a:solidFill>
+                  <a:schemeClr val="lt1"/>
+                </a:solidFill>
+                <a:latin typeface="+mn-lt"/>
+                <a:ea typeface="+mn-ea"/>
+                <a:cs typeface="+mn-cs"/>
+              </a:defRPr>
+            </a:lvl9pPr>
+          </a:lstStyle>
+          <a:p>
+            <a:pPr algn="ctr"/>
+            <a:endParaRPr lang="zh-CN" altLang="en-US"/>
+          </a:p>
+        </p:txBody>
+      </p:sp>
+      <p:sp>
+        <p:nvSpPr>
+          <p:cNvPr id="49" name="右箭头 48"/>
+          <p:cNvSpPr/>
+          <p:nvPr/>
+        </p:nvSpPr>
+        <p:spPr>
+          <a:xfrm rot="3953052">
+            <a:off x="4065778" y="2643875"/>
+            <a:ext cx="2097428" cy="212403"/>
+          </a:xfrm>
+          <a:prstGeom prst="rightArrow">
+            <a:avLst/>
+          </a:prstGeom>
+        </p:spPr>
+        <p:style>
+          <a:lnRef idx="2">
+            <a:schemeClr val="accent1">
+              <a:shade val="50000"/>
+            </a:schemeClr>
+          </a:lnRef>
+          <a:fillRef idx="1">
+            <a:schemeClr val="accent1"/>
+          </a:fillRef>
+          <a:effectRef idx="0">
+            <a:schemeClr val="accent1"/>
+          </a:effectRef>
+          <a:fontRef idx="minor">
+            <a:schemeClr val="lt1"/>
+          </a:fontRef>
+        </p:style>
+        <p:txBody>
+          <a:bodyPr rtlCol="0" anchor="ctr"/>
+          <a:lstStyle>
+            <a:defPPr>
+              <a:defRPr lang="zh-CN"/>
+            </a:defPPr>
+            <a:lvl1pPr marL="0" algn="l" defTabSz="914400" rtl="0" eaLnBrk="1" latinLnBrk="0" hangingPunct="1">
+              <a:defRPr sz="1800" kern="1200">
+                <a:solidFill>
+                  <a:schemeClr val="lt1"/>
+                </a:solidFill>
+                <a:latin typeface="+mn-lt"/>
+                <a:ea typeface="+mn-ea"/>
+                <a:cs typeface="+mn-cs"/>
+              </a:defRPr>
+            </a:lvl1pPr>
+            <a:lvl2pPr marL="457200" algn="l" defTabSz="914400" rtl="0" eaLnBrk="1" latinLnBrk="0" hangingPunct="1">
+              <a:defRPr sz="1800" kern="1200">
+                <a:solidFill>
+                  <a:schemeClr val="lt1"/>
+                </a:solidFill>
+                <a:latin typeface="+mn-lt"/>
+                <a:ea typeface="+mn-ea"/>
+                <a:cs typeface="+mn-cs"/>
+              </a:defRPr>
+            </a:lvl2pPr>
+            <a:lvl3pPr marL="914400" algn="l" defTabSz="914400" rtl="0" eaLnBrk="1" latinLnBrk="0" hangingPunct="1">
+              <a:defRPr sz="1800" kern="1200">
+                <a:solidFill>
+                  <a:schemeClr val="lt1"/>
+                </a:solidFill>
+                <a:latin typeface="+mn-lt"/>
+                <a:ea typeface="+mn-ea"/>
+                <a:cs typeface="+mn-cs"/>
+              </a:defRPr>
+            </a:lvl3pPr>
+            <a:lvl4pPr marL="1371600" algn="l" defTabSz="914400" rtl="0" eaLnBrk="1" latinLnBrk="0" hangingPunct="1">
+              <a:defRPr sz="1800" kern="1200">
+                <a:solidFill>
+                  <a:schemeClr val="lt1"/>
+                </a:solidFill>
+                <a:latin typeface="+mn-lt"/>
+                <a:ea typeface="+mn-ea"/>
+                <a:cs typeface="+mn-cs"/>
+              </a:defRPr>
+            </a:lvl4pPr>
+            <a:lvl5pPr marL="1828800" algn="l" defTabSz="914400" rtl="0" eaLnBrk="1" latinLnBrk="0" hangingPunct="1">
+              <a:defRPr sz="1800" kern="1200">
+                <a:solidFill>
+                  <a:schemeClr val="lt1"/>
+                </a:solidFill>
+                <a:latin typeface="+mn-lt"/>
+                <a:ea typeface="+mn-ea"/>
+                <a:cs typeface="+mn-cs"/>
+              </a:defRPr>
+            </a:lvl5pPr>
+            <a:lvl6pPr marL="2286000" algn="l" defTabSz="914400" rtl="0" eaLnBrk="1" latinLnBrk="0" hangingPunct="1">
+              <a:defRPr sz="1800" kern="1200">
+                <a:solidFill>
+                  <a:schemeClr val="lt1"/>
+                </a:solidFill>
+                <a:latin typeface="+mn-lt"/>
+                <a:ea typeface="+mn-ea"/>
+                <a:cs typeface="+mn-cs"/>
+              </a:defRPr>
+            </a:lvl6pPr>
+            <a:lvl7pPr marL="2743200" algn="l" defTabSz="914400" rtl="0" eaLnBrk="1" latinLnBrk="0" hangingPunct="1">
+              <a:defRPr sz="1800" kern="1200">
+                <a:solidFill>
+                  <a:schemeClr val="lt1"/>
+                </a:solidFill>
+                <a:latin typeface="+mn-lt"/>
+                <a:ea typeface="+mn-ea"/>
+                <a:cs typeface="+mn-cs"/>
+              </a:defRPr>
+            </a:lvl7pPr>
+            <a:lvl8pPr marL="3200400" algn="l" defTabSz="914400" rtl="0" eaLnBrk="1" latinLnBrk="0" hangingPunct="1">
+              <a:defRPr sz="1800" kern="1200">
+                <a:solidFill>
+                  <a:schemeClr val="lt1"/>
+                </a:solidFill>
+                <a:latin typeface="+mn-lt"/>
+                <a:ea typeface="+mn-ea"/>
+                <a:cs typeface="+mn-cs"/>
+              </a:defRPr>
+            </a:lvl8pPr>
+            <a:lvl9pPr marL="3657600" algn="l" defTabSz="914400" rtl="0" eaLnBrk="1" latinLnBrk="0" hangingPunct="1">
+              <a:defRPr sz="1800" kern="1200">
+                <a:solidFill>
+                  <a:schemeClr val="lt1"/>
+                </a:solidFill>
+                <a:latin typeface="+mn-lt"/>
+                <a:ea typeface="+mn-ea"/>
+                <a:cs typeface="+mn-cs"/>
+              </a:defRPr>
+            </a:lvl9pPr>
+          </a:lstStyle>
+          <a:p>
+            <a:pPr algn="ctr"/>
+            <a:endParaRPr lang="zh-CN" altLang="en-US"/>
+          </a:p>
+        </p:txBody>
+      </p:sp>
+      <p:sp>
+        <p:nvSpPr>
+          <p:cNvPr id="50" name="右箭头 49"/>
+          <p:cNvSpPr/>
+          <p:nvPr/>
+        </p:nvSpPr>
+        <p:spPr>
+          <a:xfrm>
+            <a:off x="3077057" y="3728934"/>
+            <a:ext cx="811158" cy="255491"/>
+          </a:xfrm>
+          <a:prstGeom prst="rightArrow">
+            <a:avLst/>
+          </a:prstGeom>
+        </p:spPr>
+        <p:style>
+          <a:lnRef idx="2">
+            <a:schemeClr val="accent1">
+              <a:shade val="50000"/>
+            </a:schemeClr>
+          </a:lnRef>
+          <a:fillRef idx="1">
+            <a:schemeClr val="accent1"/>
+          </a:fillRef>
+          <a:effectRef idx="0">
+            <a:schemeClr val="accent1"/>
+          </a:effectRef>
+          <a:fontRef idx="minor">
+            <a:schemeClr val="lt1"/>
+          </a:fontRef>
+        </p:style>
+        <p:txBody>
+          <a:bodyPr rtlCol="0" anchor="ctr"/>
+          <a:lstStyle>
+            <a:defPPr>
+              <a:defRPr lang="zh-CN"/>
+            </a:defPPr>
+            <a:lvl1pPr marL="0" algn="l" defTabSz="914400" rtl="0" eaLnBrk="1" latinLnBrk="0" hangingPunct="1">
+              <a:defRPr sz="1800" kern="1200">
+                <a:solidFill>
+                  <a:schemeClr val="lt1"/>
+                </a:solidFill>
+                <a:latin typeface="+mn-lt"/>
+                <a:ea typeface="+mn-ea"/>
+                <a:cs typeface="+mn-cs"/>
+              </a:defRPr>
+            </a:lvl1pPr>
+            <a:lvl2pPr marL="457200" algn="l" defTabSz="914400" rtl="0" eaLnBrk="1" latinLnBrk="0" hangingPunct="1">
+              <a:defRPr sz="1800" kern="1200">
+                <a:solidFill>
+                  <a:schemeClr val="lt1"/>
+                </a:solidFill>
+                <a:latin typeface="+mn-lt"/>
+                <a:ea typeface="+mn-ea"/>
+                <a:cs typeface="+mn-cs"/>
+              </a:defRPr>
+            </a:lvl2pPr>
+            <a:lvl3pPr marL="914400" algn="l" defTabSz="914400" rtl="0" eaLnBrk="1" latinLnBrk="0" hangingPunct="1">
+              <a:defRPr sz="1800" kern="1200">
+                <a:solidFill>
+                  <a:schemeClr val="lt1"/>
+                </a:solidFill>
+                <a:latin typeface="+mn-lt"/>
+                <a:ea typeface="+mn-ea"/>
+                <a:cs typeface="+mn-cs"/>
+              </a:defRPr>
+            </a:lvl3pPr>
+            <a:lvl4pPr marL="1371600" algn="l" defTabSz="914400" rtl="0" eaLnBrk="1" latinLnBrk="0" hangingPunct="1">
+              <a:defRPr sz="1800" kern="1200">
+                <a:solidFill>
+                  <a:schemeClr val="lt1"/>
+                </a:solidFill>
+                <a:latin typeface="+mn-lt"/>
+                <a:ea typeface="+mn-ea"/>
+                <a:cs typeface="+mn-cs"/>
+              </a:defRPr>
+            </a:lvl4pPr>
+            <a:lvl5pPr marL="1828800" algn="l" defTabSz="914400" rtl="0" eaLnBrk="1" latinLnBrk="0" hangingPunct="1">
+              <a:defRPr sz="1800" kern="1200">
+                <a:solidFill>
+                  <a:schemeClr val="lt1"/>
+                </a:solidFill>
+                <a:latin typeface="+mn-lt"/>
+                <a:ea typeface="+mn-ea"/>
+                <a:cs typeface="+mn-cs"/>
+              </a:defRPr>
+            </a:lvl5pPr>
+            <a:lvl6pPr marL="2286000" algn="l" defTabSz="914400" rtl="0" eaLnBrk="1" latinLnBrk="0" hangingPunct="1">
+              <a:defRPr sz="1800" kern="1200">
+                <a:solidFill>
+                  <a:schemeClr val="lt1"/>
+                </a:solidFill>
+                <a:latin typeface="+mn-lt"/>
+                <a:ea typeface="+mn-ea"/>
+                <a:cs typeface="+mn-cs"/>
+              </a:defRPr>
+            </a:lvl6pPr>
+            <a:lvl7pPr marL="2743200" algn="l" defTabSz="914400" rtl="0" eaLnBrk="1" latinLnBrk="0" hangingPunct="1">
+              <a:defRPr sz="1800" kern="1200">
+                <a:solidFill>
+                  <a:schemeClr val="lt1"/>
+                </a:solidFill>
+                <a:latin typeface="+mn-lt"/>
+                <a:ea typeface="+mn-ea"/>
+                <a:cs typeface="+mn-cs"/>
+              </a:defRPr>
+            </a:lvl7pPr>
+            <a:lvl8pPr marL="3200400" algn="l" defTabSz="914400" rtl="0" eaLnBrk="1" latinLnBrk="0" hangingPunct="1">
+              <a:defRPr sz="1800" kern="1200">
+                <a:solidFill>
+                  <a:schemeClr val="lt1"/>
+                </a:solidFill>
+                <a:latin typeface="+mn-lt"/>
+                <a:ea typeface="+mn-ea"/>
+                <a:cs typeface="+mn-cs"/>
+              </a:defRPr>
+            </a:lvl8pPr>
+            <a:lvl9pPr marL="3657600" algn="l" defTabSz="914400" rtl="0" eaLnBrk="1" latinLnBrk="0" hangingPunct="1">
+              <a:defRPr sz="1800" kern="1200">
+                <a:solidFill>
+                  <a:schemeClr val="lt1"/>
+                </a:solidFill>
+                <a:latin typeface="+mn-lt"/>
+                <a:ea typeface="+mn-ea"/>
+                <a:cs typeface="+mn-cs"/>
+              </a:defRPr>
+            </a:lvl9pPr>
+          </a:lstStyle>
+          <a:p>
+            <a:pPr algn="ctr"/>
+            <a:endParaRPr lang="zh-CN" altLang="en-US"/>
+          </a:p>
+        </p:txBody>
+      </p:sp>
+      <p:sp>
+        <p:nvSpPr>
+          <p:cNvPr id="51" name="右箭头 50"/>
+          <p:cNvSpPr/>
+          <p:nvPr/>
+        </p:nvSpPr>
+        <p:spPr>
+          <a:xfrm>
+            <a:off x="4708913" y="3734277"/>
+            <a:ext cx="811158" cy="255491"/>
+          </a:xfrm>
+          <a:prstGeom prst="rightArrow">
+            <a:avLst/>
+          </a:prstGeom>
+        </p:spPr>
+        <p:style>
+          <a:lnRef idx="2">
+            <a:schemeClr val="accent1">
+              <a:shade val="50000"/>
+            </a:schemeClr>
+          </a:lnRef>
+          <a:fillRef idx="1">
+            <a:schemeClr val="accent1"/>
+          </a:fillRef>
+          <a:effectRef idx="0">
+            <a:schemeClr val="accent1"/>
+          </a:effectRef>
+          <a:fontRef idx="minor">
+            <a:schemeClr val="lt1"/>
+          </a:fontRef>
+        </p:style>
+        <p:txBody>
+          <a:bodyPr rtlCol="0" anchor="ctr"/>
+          <a:lstStyle>
+            <a:defPPr>
+              <a:defRPr lang="zh-CN"/>
+            </a:defPPr>
+            <a:lvl1pPr marL="0" algn="l" defTabSz="914400" rtl="0" eaLnBrk="1" latinLnBrk="0" hangingPunct="1">
+              <a:defRPr sz="1800" kern="1200">
+                <a:solidFill>
+                  <a:schemeClr val="lt1"/>
+                </a:solidFill>
+                <a:latin typeface="+mn-lt"/>
+                <a:ea typeface="+mn-ea"/>
+                <a:cs typeface="+mn-cs"/>
+              </a:defRPr>
+            </a:lvl1pPr>
+            <a:lvl2pPr marL="457200" algn="l" defTabSz="914400" rtl="0" eaLnBrk="1" latinLnBrk="0" hangingPunct="1">
+              <a:defRPr sz="1800" kern="1200">
+                <a:solidFill>
+                  <a:schemeClr val="lt1"/>
+                </a:solidFill>
+                <a:latin typeface="+mn-lt"/>
+                <a:ea typeface="+mn-ea"/>
+                <a:cs typeface="+mn-cs"/>
+              </a:defRPr>
+            </a:lvl2pPr>
+            <a:lvl3pPr marL="914400" algn="l" defTabSz="914400" rtl="0" eaLnBrk="1" latinLnBrk="0" hangingPunct="1">
+              <a:defRPr sz="1800" kern="1200">
+                <a:solidFill>
+                  <a:schemeClr val="lt1"/>
+                </a:solidFill>
+                <a:latin typeface="+mn-lt"/>
+                <a:ea typeface="+mn-ea"/>
+                <a:cs typeface="+mn-cs"/>
+              </a:defRPr>
+            </a:lvl3pPr>
+            <a:lvl4pPr marL="1371600" algn="l" defTabSz="914400" rtl="0" eaLnBrk="1" latinLnBrk="0" hangingPunct="1">
+              <a:defRPr sz="1800" kern="1200">
+                <a:solidFill>
+                  <a:schemeClr val="lt1"/>
+                </a:solidFill>
+                <a:latin typeface="+mn-lt"/>
+                <a:ea typeface="+mn-ea"/>
+                <a:cs typeface="+mn-cs"/>
+              </a:defRPr>
+            </a:lvl4pPr>
+            <a:lvl5pPr marL="1828800" algn="l" defTabSz="914400" rtl="0" eaLnBrk="1" latinLnBrk="0" hangingPunct="1">
+              <a:defRPr sz="1800" kern="1200">
+                <a:solidFill>
+                  <a:schemeClr val="lt1"/>
+                </a:solidFill>
+                <a:latin typeface="+mn-lt"/>
+                <a:ea typeface="+mn-ea"/>
+                <a:cs typeface="+mn-cs"/>
+              </a:defRPr>
+            </a:lvl5pPr>
+            <a:lvl6pPr marL="2286000" algn="l" defTabSz="914400" rtl="0" eaLnBrk="1" latinLnBrk="0" hangingPunct="1">
+              <a:defRPr sz="1800" kern="1200">
+                <a:solidFill>
+                  <a:schemeClr val="lt1"/>
+                </a:solidFill>
+                <a:latin typeface="+mn-lt"/>
+                <a:ea typeface="+mn-ea"/>
+                <a:cs typeface="+mn-cs"/>
+              </a:defRPr>
+            </a:lvl6pPr>
+            <a:lvl7pPr marL="2743200" algn="l" defTabSz="914400" rtl="0" eaLnBrk="1" latinLnBrk="0" hangingPunct="1">
+              <a:defRPr sz="1800" kern="1200">
+                <a:solidFill>
+                  <a:schemeClr val="lt1"/>
+                </a:solidFill>
+                <a:latin typeface="+mn-lt"/>
+                <a:ea typeface="+mn-ea"/>
+                <a:cs typeface="+mn-cs"/>
+              </a:defRPr>
+            </a:lvl7pPr>
+            <a:lvl8pPr marL="3200400" algn="l" defTabSz="914400" rtl="0" eaLnBrk="1" latinLnBrk="0" hangingPunct="1">
+              <a:defRPr sz="1800" kern="1200">
+                <a:solidFill>
+                  <a:schemeClr val="lt1"/>
+                </a:solidFill>
+                <a:latin typeface="+mn-lt"/>
+                <a:ea typeface="+mn-ea"/>
+                <a:cs typeface="+mn-cs"/>
+              </a:defRPr>
+            </a:lvl8pPr>
+            <a:lvl9pPr marL="3657600" algn="l" defTabSz="914400" rtl="0" eaLnBrk="1" latinLnBrk="0" hangingPunct="1">
+              <a:defRPr sz="1800" kern="1200">
+                <a:solidFill>
+                  <a:schemeClr val="lt1"/>
+                </a:solidFill>
+                <a:latin typeface="+mn-lt"/>
+                <a:ea typeface="+mn-ea"/>
+                <a:cs typeface="+mn-cs"/>
+              </a:defRPr>
+            </a:lvl9pPr>
+          </a:lstStyle>
+          <a:p>
+            <a:pPr algn="ctr"/>
+            <a:endParaRPr lang="zh-CN" altLang="en-US"/>
+          </a:p>
+        </p:txBody>
+      </p:sp>
+      <p:sp>
+        <p:nvSpPr>
+          <p:cNvPr id="52" name="右箭头 51"/>
+          <p:cNvSpPr/>
+          <p:nvPr/>
+        </p:nvSpPr>
+        <p:spPr>
+          <a:xfrm rot="17557957">
+            <a:off x="2438386" y="2741655"/>
+            <a:ext cx="2097428" cy="212403"/>
+          </a:xfrm>
+          <a:prstGeom prst="rightArrow">
+            <a:avLst/>
+          </a:prstGeom>
+        </p:spPr>
+        <p:style>
+          <a:lnRef idx="2">
+            <a:schemeClr val="accent1">
+              <a:shade val="50000"/>
+            </a:schemeClr>
+          </a:lnRef>
+          <a:fillRef idx="1">
+            <a:schemeClr val="accent1"/>
+          </a:fillRef>
+          <a:effectRef idx="0">
+            <a:schemeClr val="accent1"/>
+          </a:effectRef>
+          <a:fontRef idx="minor">
+            <a:schemeClr val="lt1"/>
+          </a:fontRef>
+        </p:style>
+        <p:txBody>
+          <a:bodyPr rtlCol="0" anchor="ctr"/>
+          <a:lstStyle>
+            <a:defPPr>
+              <a:defRPr lang="zh-CN"/>
+            </a:defPPr>
+            <a:lvl1pPr marL="0" algn="l" defTabSz="914400" rtl="0" eaLnBrk="1" latinLnBrk="0" hangingPunct="1">
+              <a:defRPr sz="1800" kern="1200">
+                <a:solidFill>
+                  <a:schemeClr val="lt1"/>
+                </a:solidFill>
+                <a:latin typeface="+mn-lt"/>
+                <a:ea typeface="+mn-ea"/>
+                <a:cs typeface="+mn-cs"/>
+              </a:defRPr>
+            </a:lvl1pPr>
+            <a:lvl2pPr marL="457200" algn="l" defTabSz="914400" rtl="0" eaLnBrk="1" latinLnBrk="0" hangingPunct="1">
+              <a:defRPr sz="1800" kern="1200">
+                <a:solidFill>
+                  <a:schemeClr val="lt1"/>
+                </a:solidFill>
+                <a:latin typeface="+mn-lt"/>
+                <a:ea typeface="+mn-ea"/>
+                <a:cs typeface="+mn-cs"/>
+              </a:defRPr>
+            </a:lvl2pPr>
+            <a:lvl3pPr marL="914400" algn="l" defTabSz="914400" rtl="0" eaLnBrk="1" latinLnBrk="0" hangingPunct="1">
+              <a:defRPr sz="1800" kern="1200">
+                <a:solidFill>
+                  <a:schemeClr val="lt1"/>
+                </a:solidFill>
+                <a:latin typeface="+mn-lt"/>
+                <a:ea typeface="+mn-ea"/>
+                <a:cs typeface="+mn-cs"/>
+              </a:defRPr>
+            </a:lvl3pPr>
+            <a:lvl4pPr marL="1371600" algn="l" defTabSz="914400" rtl="0" eaLnBrk="1" latinLnBrk="0" hangingPunct="1">
+              <a:defRPr sz="1800" kern="1200">
+                <a:solidFill>
+                  <a:schemeClr val="lt1"/>
+                </a:solidFill>
+                <a:latin typeface="+mn-lt"/>
+                <a:ea typeface="+mn-ea"/>
+                <a:cs typeface="+mn-cs"/>
+              </a:defRPr>
+            </a:lvl4pPr>
+            <a:lvl5pPr marL="1828800" algn="l" defTabSz="914400" rtl="0" eaLnBrk="1" latinLnBrk="0" hangingPunct="1">
+              <a:defRPr sz="1800" kern="1200">
+                <a:solidFill>
+                  <a:schemeClr val="lt1"/>
+                </a:solidFill>
+                <a:latin typeface="+mn-lt"/>
+                <a:ea typeface="+mn-ea"/>
+                <a:cs typeface="+mn-cs"/>
+              </a:defRPr>
+            </a:lvl5pPr>
+            <a:lvl6pPr marL="2286000" algn="l" defTabSz="914400" rtl="0" eaLnBrk="1" latinLnBrk="0" hangingPunct="1">
+              <a:defRPr sz="1800" kern="1200">
+                <a:solidFill>
+                  <a:schemeClr val="lt1"/>
+                </a:solidFill>
+                <a:latin typeface="+mn-lt"/>
+                <a:ea typeface="+mn-ea"/>
+                <a:cs typeface="+mn-cs"/>
+              </a:defRPr>
+            </a:lvl6pPr>
+            <a:lvl7pPr marL="2743200" algn="l" defTabSz="914400" rtl="0" eaLnBrk="1" latinLnBrk="0" hangingPunct="1">
+              <a:defRPr sz="1800" kern="1200">
+                <a:solidFill>
+                  <a:schemeClr val="lt1"/>
+                </a:solidFill>
+                <a:latin typeface="+mn-lt"/>
+                <a:ea typeface="+mn-ea"/>
+                <a:cs typeface="+mn-cs"/>
+              </a:defRPr>
+            </a:lvl7pPr>
+            <a:lvl8pPr marL="3200400" algn="l" defTabSz="914400" rtl="0" eaLnBrk="1" latinLnBrk="0" hangingPunct="1">
+              <a:defRPr sz="1800" kern="1200">
+                <a:solidFill>
+                  <a:schemeClr val="lt1"/>
+                </a:solidFill>
+                <a:latin typeface="+mn-lt"/>
+                <a:ea typeface="+mn-ea"/>
+                <a:cs typeface="+mn-cs"/>
+              </a:defRPr>
+            </a:lvl8pPr>
+            <a:lvl9pPr marL="3657600" algn="l" defTabSz="914400" rtl="0" eaLnBrk="1" latinLnBrk="0" hangingPunct="1">
+              <a:defRPr sz="1800" kern="1200">
+                <a:solidFill>
+                  <a:schemeClr val="lt1"/>
+                </a:solidFill>
+                <a:latin typeface="+mn-lt"/>
+                <a:ea typeface="+mn-ea"/>
+                <a:cs typeface="+mn-cs"/>
+              </a:defRPr>
+            </a:lvl9pPr>
+          </a:lstStyle>
+          <a:p>
+            <a:pPr algn="ctr"/>
+            <a:endParaRPr lang="zh-CN" altLang="en-US"/>
+          </a:p>
+        </p:txBody>
+      </p:sp>
+      <p:sp>
+        <p:nvSpPr>
+          <p:cNvPr id="53" name="右箭头 52"/>
+          <p:cNvSpPr/>
+          <p:nvPr/>
+        </p:nvSpPr>
+        <p:spPr>
+          <a:xfrm rot="17557957">
+            <a:off x="4070192" y="2736056"/>
+            <a:ext cx="2097428" cy="212403"/>
+          </a:xfrm>
+          <a:prstGeom prst="rightArrow">
+            <a:avLst/>
+          </a:prstGeom>
+        </p:spPr>
+        <p:style>
+          <a:lnRef idx="2">
+            <a:schemeClr val="accent1">
+              <a:shade val="50000"/>
+            </a:schemeClr>
+          </a:lnRef>
+          <a:fillRef idx="1">
+            <a:schemeClr val="accent1"/>
+          </a:fillRef>
+          <a:effectRef idx="0">
+            <a:schemeClr val="accent1"/>
+          </a:effectRef>
+          <a:fontRef idx="minor">
+            <a:schemeClr val="lt1"/>
+          </a:fontRef>
+        </p:style>
+        <p:txBody>
+          <a:bodyPr rtlCol="0" anchor="ctr"/>
+          <a:lstStyle>
+            <a:defPPr>
+              <a:defRPr lang="zh-CN"/>
+            </a:defPPr>
+            <a:lvl1pPr marL="0" algn="l" defTabSz="914400" rtl="0" eaLnBrk="1" latinLnBrk="0" hangingPunct="1">
+              <a:defRPr sz="1800" kern="1200">
+                <a:solidFill>
+                  <a:schemeClr val="lt1"/>
+                </a:solidFill>
+                <a:latin typeface="+mn-lt"/>
+                <a:ea typeface="+mn-ea"/>
+                <a:cs typeface="+mn-cs"/>
+              </a:defRPr>
+            </a:lvl1pPr>
+            <a:lvl2pPr marL="457200" algn="l" defTabSz="914400" rtl="0" eaLnBrk="1" latinLnBrk="0" hangingPunct="1">
+              <a:defRPr sz="1800" kern="1200">
+                <a:solidFill>
+                  <a:schemeClr val="lt1"/>
+                </a:solidFill>
+                <a:latin typeface="+mn-lt"/>
+                <a:ea typeface="+mn-ea"/>
+                <a:cs typeface="+mn-cs"/>
+              </a:defRPr>
+            </a:lvl2pPr>
+            <a:lvl3pPr marL="914400" algn="l" defTabSz="914400" rtl="0" eaLnBrk="1" latinLnBrk="0" hangingPunct="1">
+              <a:defRPr sz="1800" kern="1200">
+                <a:solidFill>
+                  <a:schemeClr val="lt1"/>
+                </a:solidFill>
+                <a:latin typeface="+mn-lt"/>
+                <a:ea typeface="+mn-ea"/>
+                <a:cs typeface="+mn-cs"/>
+              </a:defRPr>
+            </a:lvl3pPr>
+            <a:lvl4pPr marL="1371600" algn="l" defTabSz="914400" rtl="0" eaLnBrk="1" latinLnBrk="0" hangingPunct="1">
+              <a:defRPr sz="1800" kern="1200">
+                <a:solidFill>
+                  <a:schemeClr val="lt1"/>
+                </a:solidFill>
+                <a:latin typeface="+mn-lt"/>
+                <a:ea typeface="+mn-ea"/>
+                <a:cs typeface="+mn-cs"/>
+              </a:defRPr>
+            </a:lvl4pPr>
+            <a:lvl5pPr marL="1828800" algn="l" defTabSz="914400" rtl="0" eaLnBrk="1" latinLnBrk="0" hangingPunct="1">
+              <a:defRPr sz="1800" kern="1200">
+                <a:solidFill>
+                  <a:schemeClr val="lt1"/>
+                </a:solidFill>
+                <a:latin typeface="+mn-lt"/>
+                <a:ea typeface="+mn-ea"/>
+                <a:cs typeface="+mn-cs"/>
+              </a:defRPr>
+            </a:lvl5pPr>
+            <a:lvl6pPr marL="2286000" algn="l" defTabSz="914400" rtl="0" eaLnBrk="1" latinLnBrk="0" hangingPunct="1">
+              <a:defRPr sz="1800" kern="1200">
+                <a:solidFill>
+                  <a:schemeClr val="lt1"/>
+                </a:solidFill>
+                <a:latin typeface="+mn-lt"/>
+                <a:ea typeface="+mn-ea"/>
+                <a:cs typeface="+mn-cs"/>
+              </a:defRPr>
+            </a:lvl6pPr>
+            <a:lvl7pPr marL="2743200" algn="l" defTabSz="914400" rtl="0" eaLnBrk="1" latinLnBrk="0" hangingPunct="1">
+              <a:defRPr sz="1800" kern="1200">
+                <a:solidFill>
+                  <a:schemeClr val="lt1"/>
+                </a:solidFill>
+                <a:latin typeface="+mn-lt"/>
+                <a:ea typeface="+mn-ea"/>
+                <a:cs typeface="+mn-cs"/>
+              </a:defRPr>
+            </a:lvl7pPr>
+            <a:lvl8pPr marL="3200400" algn="l" defTabSz="914400" rtl="0" eaLnBrk="1" latinLnBrk="0" hangingPunct="1">
+              <a:defRPr sz="1800" kern="1200">
+                <a:solidFill>
+                  <a:schemeClr val="lt1"/>
+                </a:solidFill>
+                <a:latin typeface="+mn-lt"/>
+                <a:ea typeface="+mn-ea"/>
+                <a:cs typeface="+mn-cs"/>
+              </a:defRPr>
+            </a:lvl8pPr>
+            <a:lvl9pPr marL="3657600" algn="l" defTabSz="914400" rtl="0" eaLnBrk="1" latinLnBrk="0" hangingPunct="1">
+              <a:defRPr sz="1800" kern="1200">
+                <a:solidFill>
+                  <a:schemeClr val="lt1"/>
+                </a:solidFill>
+                <a:latin typeface="+mn-lt"/>
+                <a:ea typeface="+mn-ea"/>
+                <a:cs typeface="+mn-cs"/>
+              </a:defRPr>
+            </a:lvl9pPr>
+          </a:lstStyle>
+          <a:p>
+            <a:pPr algn="ctr"/>
+            <a:endParaRPr lang="zh-CN" altLang="en-US"/>
+          </a:p>
+        </p:txBody>
+      </p:sp>
+      <p:sp>
+        <p:nvSpPr>
+          <p:cNvPr id="54" name="右箭头 53"/>
+          <p:cNvSpPr/>
+          <p:nvPr/>
+        </p:nvSpPr>
+        <p:spPr>
+          <a:xfrm rot="19264499">
+            <a:off x="5999477" y="3227037"/>
+            <a:ext cx="1364403" cy="165824"/>
+          </a:xfrm>
+          <a:prstGeom prst="rightArrow">
+            <a:avLst/>
+          </a:prstGeom>
+        </p:spPr>
+        <p:style>
+          <a:lnRef idx="2">
+            <a:schemeClr val="accent1">
+              <a:shade val="50000"/>
+            </a:schemeClr>
+          </a:lnRef>
+          <a:fillRef idx="1">
+            <a:schemeClr val="accent1"/>
+          </a:fillRef>
+          <a:effectRef idx="0">
+            <a:schemeClr val="accent1"/>
+          </a:effectRef>
+          <a:fontRef idx="minor">
+            <a:schemeClr val="lt1"/>
+          </a:fontRef>
+        </p:style>
+        <p:txBody>
+          <a:bodyPr rtlCol="0" anchor="ctr"/>
+          <a:lstStyle>
+            <a:defPPr>
+              <a:defRPr lang="zh-CN"/>
+            </a:defPPr>
+            <a:lvl1pPr marL="0" algn="l" defTabSz="914400" rtl="0" eaLnBrk="1" latinLnBrk="0" hangingPunct="1">
+              <a:defRPr sz="1800" kern="1200">
+                <a:solidFill>
+                  <a:schemeClr val="lt1"/>
+                </a:solidFill>
+                <a:latin typeface="+mn-lt"/>
+                <a:ea typeface="+mn-ea"/>
+                <a:cs typeface="+mn-cs"/>
+              </a:defRPr>
+            </a:lvl1pPr>
+            <a:lvl2pPr marL="457200" algn="l" defTabSz="914400" rtl="0" eaLnBrk="1" latinLnBrk="0" hangingPunct="1">
+              <a:defRPr sz="1800" kern="1200">
+                <a:solidFill>
+                  <a:schemeClr val="lt1"/>
+                </a:solidFill>
+                <a:latin typeface="+mn-lt"/>
+                <a:ea typeface="+mn-ea"/>
+                <a:cs typeface="+mn-cs"/>
+              </a:defRPr>
+            </a:lvl2pPr>
+            <a:lvl3pPr marL="914400" algn="l" defTabSz="914400" rtl="0" eaLnBrk="1" latinLnBrk="0" hangingPunct="1">
+              <a:defRPr sz="1800" kern="1200">
+                <a:solidFill>
+                  <a:schemeClr val="lt1"/>
+                </a:solidFill>
+                <a:latin typeface="+mn-lt"/>
+                <a:ea typeface="+mn-ea"/>
+                <a:cs typeface="+mn-cs"/>
+              </a:defRPr>
+            </a:lvl3pPr>
+            <a:lvl4pPr marL="1371600" algn="l" defTabSz="914400" rtl="0" eaLnBrk="1" latinLnBrk="0" hangingPunct="1">
+              <a:defRPr sz="1800" kern="1200">
+                <a:solidFill>
+                  <a:schemeClr val="lt1"/>
+                </a:solidFill>
+                <a:latin typeface="+mn-lt"/>
+                <a:ea typeface="+mn-ea"/>
+                <a:cs typeface="+mn-cs"/>
+              </a:defRPr>
+            </a:lvl4pPr>
+            <a:lvl5pPr marL="1828800" algn="l" defTabSz="914400" rtl="0" eaLnBrk="1" latinLnBrk="0" hangingPunct="1">
+              <a:defRPr sz="1800" kern="1200">
+                <a:solidFill>
+                  <a:schemeClr val="lt1"/>
+                </a:solidFill>
+                <a:latin typeface="+mn-lt"/>
+                <a:ea typeface="+mn-ea"/>
+                <a:cs typeface="+mn-cs"/>
+              </a:defRPr>
+            </a:lvl5pPr>
+            <a:lvl6pPr marL="2286000" algn="l" defTabSz="914400" rtl="0" eaLnBrk="1" latinLnBrk="0" hangingPunct="1">
+              <a:defRPr sz="1800" kern="1200">
+                <a:solidFill>
+                  <a:schemeClr val="lt1"/>
+                </a:solidFill>
+                <a:latin typeface="+mn-lt"/>
+                <a:ea typeface="+mn-ea"/>
+                <a:cs typeface="+mn-cs"/>
+              </a:defRPr>
+            </a:lvl6pPr>
+            <a:lvl7pPr marL="2743200" algn="l" defTabSz="914400" rtl="0" eaLnBrk="1" latinLnBrk="0" hangingPunct="1">
+              <a:defRPr sz="1800" kern="1200">
+                <a:solidFill>
+                  <a:schemeClr val="lt1"/>
+                </a:solidFill>
+                <a:latin typeface="+mn-lt"/>
+                <a:ea typeface="+mn-ea"/>
+                <a:cs typeface="+mn-cs"/>
+              </a:defRPr>
+            </a:lvl7pPr>
+            <a:lvl8pPr marL="3200400" algn="l" defTabSz="914400" rtl="0" eaLnBrk="1" latinLnBrk="0" hangingPunct="1">
+              <a:defRPr sz="1800" kern="1200">
+                <a:solidFill>
+                  <a:schemeClr val="lt1"/>
+                </a:solidFill>
+                <a:latin typeface="+mn-lt"/>
+                <a:ea typeface="+mn-ea"/>
+                <a:cs typeface="+mn-cs"/>
+              </a:defRPr>
+            </a:lvl8pPr>
+            <a:lvl9pPr marL="3657600" algn="l" defTabSz="914400" rtl="0" eaLnBrk="1" latinLnBrk="0" hangingPunct="1">
+              <a:defRPr sz="1800" kern="1200">
+                <a:solidFill>
+                  <a:schemeClr val="lt1"/>
+                </a:solidFill>
+                <a:latin typeface="+mn-lt"/>
+                <a:ea typeface="+mn-ea"/>
+                <a:cs typeface="+mn-cs"/>
+              </a:defRPr>
+            </a:lvl9pPr>
+          </a:lstStyle>
+          <a:p>
+            <a:pPr algn="ctr"/>
+            <a:endParaRPr lang="zh-CN" altLang="en-US"/>
+          </a:p>
+        </p:txBody>
+      </p:sp>
+      <p:sp>
+        <p:nvSpPr>
+          <p:cNvPr id="56" name="文本框 55"/>
+          <p:cNvSpPr txBox="1"/>
+          <p:nvPr/>
+        </p:nvSpPr>
+        <p:spPr>
+          <a:xfrm>
+            <a:off x="2419590" y="1683141"/>
+            <a:ext cx="389850" cy="369332"/>
+          </a:xfrm>
+          <a:prstGeom prst="rect">
+            <a:avLst/>
+          </a:prstGeom>
+          <a:noFill/>
+        </p:spPr>
+        <p:txBody>
+          <a:bodyPr wrap="none" rtlCol="0">
+            <a:spAutoFit/>
+          </a:bodyPr>
+          <a:lstStyle/>
+          <a:p>
+            <a:r>
+              <a:rPr lang="zh-CN" altLang="en-US" dirty="0" smtClean="0">
+                <a:sym typeface="Wingdings" panose="05000000000000000000" pitchFamily="2" charset="2"/>
+              </a:rPr>
+              <a:t></a:t>
+            </a:r>
+            <a:endParaRPr lang="zh-CN" altLang="en-US" dirty="0"/>
+          </a:p>
+        </p:txBody>
+      </p:sp>
+      <p:sp>
+        <p:nvSpPr>
+          <p:cNvPr id="58" name="文本框 57"/>
+          <p:cNvSpPr txBox="1"/>
+          <p:nvPr/>
+        </p:nvSpPr>
+        <p:spPr>
+          <a:xfrm>
+            <a:off x="2409784" y="3514458"/>
+            <a:ext cx="389850" cy="369332"/>
+          </a:xfrm>
+          <a:prstGeom prst="rect">
+            <a:avLst/>
+          </a:prstGeom>
+          <a:noFill/>
+        </p:spPr>
+        <p:txBody>
+          <a:bodyPr wrap="none" rtlCol="0">
+            <a:spAutoFit/>
+          </a:bodyPr>
+          <a:lstStyle/>
+          <a:p>
+            <a:r>
+              <a:rPr lang="zh-CN" altLang="en-US" dirty="0" smtClean="0">
+                <a:sym typeface="Wingdings" panose="05000000000000000000" pitchFamily="2" charset="2"/>
+              </a:rPr>
+              <a:t></a:t>
+            </a:r>
+            <a:endParaRPr lang="zh-CN" altLang="en-US" dirty="0"/>
+          </a:p>
+        </p:txBody>
+      </p:sp>
+      <p:sp>
+        <p:nvSpPr>
+          <p:cNvPr id="59" name="文本框 58"/>
+          <p:cNvSpPr txBox="1"/>
+          <p:nvPr/>
+        </p:nvSpPr>
+        <p:spPr>
+          <a:xfrm>
+            <a:off x="4071973" y="3514458"/>
+            <a:ext cx="389850" cy="369332"/>
+          </a:xfrm>
+          <a:prstGeom prst="rect">
+            <a:avLst/>
+          </a:prstGeom>
+          <a:noFill/>
+        </p:spPr>
+        <p:txBody>
+          <a:bodyPr wrap="none" rtlCol="0">
+            <a:spAutoFit/>
+          </a:bodyPr>
+          <a:lstStyle/>
+          <a:p>
+            <a:r>
+              <a:rPr lang="zh-CN" altLang="en-US" dirty="0" smtClean="0">
+                <a:sym typeface="Wingdings" panose="05000000000000000000" pitchFamily="2" charset="2"/>
+              </a:rPr>
+              <a:t></a:t>
+            </a:r>
+            <a:endParaRPr lang="zh-CN" altLang="en-US" dirty="0"/>
+          </a:p>
+        </p:txBody>
+      </p:sp>
+      <p:sp>
+        <p:nvSpPr>
+          <p:cNvPr id="60" name="文本框 59"/>
+          <p:cNvSpPr txBox="1"/>
+          <p:nvPr/>
+        </p:nvSpPr>
+        <p:spPr>
+          <a:xfrm>
+            <a:off x="4045927" y="1588551"/>
+            <a:ext cx="389850" cy="369332"/>
+          </a:xfrm>
+          <a:prstGeom prst="rect">
+            <a:avLst/>
+          </a:prstGeom>
+          <a:noFill/>
+        </p:spPr>
+        <p:txBody>
+          <a:bodyPr wrap="none" rtlCol="0">
+            <a:spAutoFit/>
+          </a:bodyPr>
+          <a:lstStyle/>
+          <a:p>
+            <a:r>
+              <a:rPr lang="zh-CN" altLang="en-US" dirty="0" smtClean="0">
+                <a:sym typeface="Wingdings" panose="05000000000000000000" pitchFamily="2" charset="2"/>
+              </a:rPr>
+              <a:t></a:t>
+            </a:r>
+            <a:endParaRPr lang="zh-CN" altLang="en-US" dirty="0"/>
+          </a:p>
+        </p:txBody>
+      </p:sp>
+      <p:sp>
+        <p:nvSpPr>
+          <p:cNvPr id="61" name="文本框 60"/>
+          <p:cNvSpPr txBox="1"/>
+          <p:nvPr/>
+        </p:nvSpPr>
+        <p:spPr>
+          <a:xfrm>
+            <a:off x="5709003" y="3580147"/>
+            <a:ext cx="389850" cy="369332"/>
+          </a:xfrm>
+          <a:prstGeom prst="rect">
+            <a:avLst/>
+          </a:prstGeom>
+          <a:noFill/>
+        </p:spPr>
+        <p:txBody>
+          <a:bodyPr wrap="none" rtlCol="0">
+            <a:spAutoFit/>
+          </a:bodyPr>
+          <a:lstStyle/>
+          <a:p>
+            <a:r>
+              <a:rPr lang="zh-CN" altLang="en-US" dirty="0" smtClean="0">
+                <a:sym typeface="Wingdings" panose="05000000000000000000" pitchFamily="2" charset="2"/>
+              </a:rPr>
+              <a:t></a:t>
+            </a:r>
+            <a:endParaRPr lang="zh-CN" altLang="en-US" dirty="0"/>
+          </a:p>
+        </p:txBody>
+      </p:sp>
+      <p:sp>
+        <p:nvSpPr>
+          <p:cNvPr id="62" name="文本框 61"/>
+          <p:cNvSpPr txBox="1"/>
+          <p:nvPr/>
+        </p:nvSpPr>
+        <p:spPr>
+          <a:xfrm>
+            <a:off x="5685695" y="1575565"/>
+            <a:ext cx="389850" cy="369332"/>
+          </a:xfrm>
+          <a:prstGeom prst="rect">
+            <a:avLst/>
+          </a:prstGeom>
+          <a:noFill/>
+        </p:spPr>
+        <p:txBody>
+          <a:bodyPr wrap="none" rtlCol="0">
+            <a:spAutoFit/>
+          </a:bodyPr>
+          <a:lstStyle/>
+          <a:p>
+            <a:r>
+              <a:rPr lang="zh-CN" altLang="en-US" dirty="0" smtClean="0">
+                <a:sym typeface="Wingdings" panose="05000000000000000000" pitchFamily="2" charset="2"/>
+              </a:rPr>
+              <a:t></a:t>
+            </a:r>
+            <a:endParaRPr lang="zh-CN" altLang="en-US" dirty="0"/>
+          </a:p>
+        </p:txBody>
+      </p:sp>
+      <p:sp>
+        <p:nvSpPr>
+          <p:cNvPr id="63" name="文本框 62"/>
+          <p:cNvSpPr txBox="1"/>
+          <p:nvPr/>
+        </p:nvSpPr>
+        <p:spPr>
+          <a:xfrm>
+            <a:off x="7391044" y="2403019"/>
+            <a:ext cx="389850" cy="369332"/>
+          </a:xfrm>
+          <a:prstGeom prst="rect">
+            <a:avLst/>
+          </a:prstGeom>
+          <a:noFill/>
+        </p:spPr>
+        <p:txBody>
+          <a:bodyPr wrap="none" rtlCol="0">
+            <a:spAutoFit/>
+          </a:bodyPr>
+          <a:lstStyle/>
+          <a:p>
+            <a:r>
+              <a:rPr lang="zh-CN" altLang="en-US" dirty="0" smtClean="0">
+                <a:sym typeface="Wingdings" panose="05000000000000000000" pitchFamily="2" charset="2"/>
+              </a:rPr>
+              <a:t></a:t>
+            </a:r>
+            <a:endParaRPr lang="zh-CN" altLang="en-US" dirty="0"/>
+          </a:p>
+        </p:txBody>
+      </p:sp>
+    </p:spTree>
+    <p:extLst>
+      <p:ext uri="{BB962C8B-B14F-4D97-AF65-F5344CB8AC3E}">
+        <p14:creationId xmlns:p14="http://schemas.microsoft.com/office/powerpoint/2010/main" val="2657916109"/>
+      </p:ext>
+    </p:extLst>
+  </p:cSld>
+  <p:clrMapOvr>
+    <a:masterClrMapping/>
+  </p:clrMapOvr>
+</p:sld>
+</file>
+
 <file path=ppt/theme/theme1.xml><?xml version="1.0" encoding="utf-8"?>
 <a:theme xmlns:a="http://schemas.openxmlformats.org/drawingml/2006/main" name="Office 主题">
   <a:themeElements>

</xml_diff>